<commit_message>
Partial update of bookdown guide (work in progress)
</commit_message>
<xml_diff>
--- a/bookdown source/files/ppt/Examples for Bookdown.pptx
+++ b/bookdown source/files/ppt/Examples for Bookdown.pptx
@@ -7,6 +7,7 @@
   <p:sldIdLst>
     <p:sldId id="256" r:id="rId2"/>
     <p:sldId id="257" r:id="rId3"/>
+    <p:sldId id="258" r:id="rId4"/>
   </p:sldIdLst>
   <p:sldSz cx="12192000" cy="6858000"/>
   <p:notesSz cx="6858000" cy="9144000"/>
@@ -260,7 +261,7 @@
           <a:p>
             <a:fld id="{63889709-0435-BE4C-897A-4998963CC9D4}" type="datetimeFigureOut">
               <a:rPr lang="en-US" smtClean="0"/>
-              <a:t>10/8/19</a:t>
+              <a:t>10/23/19</a:t>
             </a:fld>
             <a:endParaRPr lang="en-US"/>
           </a:p>
@@ -458,7 +459,7 @@
           <a:p>
             <a:fld id="{63889709-0435-BE4C-897A-4998963CC9D4}" type="datetimeFigureOut">
               <a:rPr lang="en-US" smtClean="0"/>
-              <a:t>10/8/19</a:t>
+              <a:t>10/23/19</a:t>
             </a:fld>
             <a:endParaRPr lang="en-US"/>
           </a:p>
@@ -666,7 +667,7 @@
           <a:p>
             <a:fld id="{63889709-0435-BE4C-897A-4998963CC9D4}" type="datetimeFigureOut">
               <a:rPr lang="en-US" smtClean="0"/>
-              <a:t>10/8/19</a:t>
+              <a:t>10/23/19</a:t>
             </a:fld>
             <a:endParaRPr lang="en-US"/>
           </a:p>
@@ -864,7 +865,7 @@
           <a:p>
             <a:fld id="{63889709-0435-BE4C-897A-4998963CC9D4}" type="datetimeFigureOut">
               <a:rPr lang="en-US" smtClean="0"/>
-              <a:t>10/8/19</a:t>
+              <a:t>10/23/19</a:t>
             </a:fld>
             <a:endParaRPr lang="en-US"/>
           </a:p>
@@ -1139,7 +1140,7 @@
           <a:p>
             <a:fld id="{63889709-0435-BE4C-897A-4998963CC9D4}" type="datetimeFigureOut">
               <a:rPr lang="en-US" smtClean="0"/>
-              <a:t>10/8/19</a:t>
+              <a:t>10/23/19</a:t>
             </a:fld>
             <a:endParaRPr lang="en-US"/>
           </a:p>
@@ -1404,7 +1405,7 @@
           <a:p>
             <a:fld id="{63889709-0435-BE4C-897A-4998963CC9D4}" type="datetimeFigureOut">
               <a:rPr lang="en-US" smtClean="0"/>
-              <a:t>10/8/19</a:t>
+              <a:t>10/23/19</a:t>
             </a:fld>
             <a:endParaRPr lang="en-US"/>
           </a:p>
@@ -1816,7 +1817,7 @@
           <a:p>
             <a:fld id="{63889709-0435-BE4C-897A-4998963CC9D4}" type="datetimeFigureOut">
               <a:rPr lang="en-US" smtClean="0"/>
-              <a:t>10/8/19</a:t>
+              <a:t>10/23/19</a:t>
             </a:fld>
             <a:endParaRPr lang="en-US"/>
           </a:p>
@@ -1957,7 +1958,7 @@
           <a:p>
             <a:fld id="{63889709-0435-BE4C-897A-4998963CC9D4}" type="datetimeFigureOut">
               <a:rPr lang="en-US" smtClean="0"/>
-              <a:t>10/8/19</a:t>
+              <a:t>10/23/19</a:t>
             </a:fld>
             <a:endParaRPr lang="en-US"/>
           </a:p>
@@ -2070,7 +2071,7 @@
           <a:p>
             <a:fld id="{63889709-0435-BE4C-897A-4998963CC9D4}" type="datetimeFigureOut">
               <a:rPr lang="en-US" smtClean="0"/>
-              <a:t>10/8/19</a:t>
+              <a:t>10/23/19</a:t>
             </a:fld>
             <a:endParaRPr lang="en-US"/>
           </a:p>
@@ -2381,7 +2382,7 @@
           <a:p>
             <a:fld id="{63889709-0435-BE4C-897A-4998963CC9D4}" type="datetimeFigureOut">
               <a:rPr lang="en-US" smtClean="0"/>
-              <a:t>10/8/19</a:t>
+              <a:t>10/23/19</a:t>
             </a:fld>
             <a:endParaRPr lang="en-US"/>
           </a:p>
@@ -2669,7 +2670,7 @@
           <a:p>
             <a:fld id="{63889709-0435-BE4C-897A-4998963CC9D4}" type="datetimeFigureOut">
               <a:rPr lang="en-US" smtClean="0"/>
-              <a:t>10/8/19</a:t>
+              <a:t>10/23/19</a:t>
             </a:fld>
             <a:endParaRPr lang="en-US"/>
           </a:p>
@@ -2910,7 +2911,7 @@
           <a:p>
             <a:fld id="{63889709-0435-BE4C-897A-4998963CC9D4}" type="datetimeFigureOut">
               <a:rPr lang="en-US" smtClean="0"/>
-              <a:t>10/8/19</a:t>
+              <a:t>10/23/19</a:t>
             </a:fld>
             <a:endParaRPr lang="en-US"/>
           </a:p>
@@ -4688,6 +4689,598 @@
 </p:sld>
 </file>
 
+<file path=ppt/slides/slide3.xml><?xml version="1.0" encoding="utf-8"?>
+<p:sld xmlns:a="http://schemas.openxmlformats.org/drawingml/2006/main" xmlns:r="http://schemas.openxmlformats.org/officeDocument/2006/relationships" xmlns:p="http://schemas.openxmlformats.org/presentationml/2006/main">
+  <p:cSld>
+    <p:spTree>
+      <p:nvGrpSpPr>
+        <p:cNvPr id="1" name=""/>
+        <p:cNvGrpSpPr/>
+        <p:nvPr/>
+      </p:nvGrpSpPr>
+      <p:grpSpPr>
+        <a:xfrm>
+          <a:off x="0" y="0"/>
+          <a:ext cx="0" cy="0"/>
+          <a:chOff x="0" y="0"/>
+          <a:chExt cx="0" cy="0"/>
+        </a:xfrm>
+      </p:grpSpPr>
+      <p:sp>
+        <p:nvSpPr>
+          <p:cNvPr id="4" name="Rounded Rectangle 3">
+            <a:extLst>
+              <a:ext uri="{FF2B5EF4-FFF2-40B4-BE49-F238E27FC236}">
+                <a16:creationId xmlns:a16="http://schemas.microsoft.com/office/drawing/2014/main" id="{397B3896-358B-E347-8BDE-B5C6208FEE2F}"/>
+              </a:ext>
+            </a:extLst>
+          </p:cNvPr>
+          <p:cNvSpPr/>
+          <p:nvPr/>
+        </p:nvSpPr>
+        <p:spPr>
+          <a:xfrm>
+            <a:off x="3020992" y="798653"/>
+            <a:ext cx="2847372" cy="2592729"/>
+          </a:xfrm>
+          <a:prstGeom prst="roundRect">
+            <a:avLst/>
+          </a:prstGeom>
+          <a:solidFill>
+            <a:schemeClr val="bg1"/>
+          </a:solidFill>
+          <a:ln w="25400">
+            <a:solidFill>
+              <a:schemeClr val="tx1"/>
+            </a:solidFill>
+          </a:ln>
+          <a:effectLst>
+            <a:outerShdw blurRad="50800" dist="38100" dir="2700000" algn="tl" rotWithShape="0">
+              <a:prstClr val="black">
+                <a:alpha val="40000"/>
+              </a:prstClr>
+            </a:outerShdw>
+          </a:effectLst>
+        </p:spPr>
+        <p:style>
+          <a:lnRef idx="2">
+            <a:schemeClr val="accent1">
+              <a:shade val="50000"/>
+            </a:schemeClr>
+          </a:lnRef>
+          <a:fillRef idx="1">
+            <a:schemeClr val="accent1"/>
+          </a:fillRef>
+          <a:effectRef idx="0">
+            <a:schemeClr val="accent1"/>
+          </a:effectRef>
+          <a:fontRef idx="minor">
+            <a:schemeClr val="lt1"/>
+          </a:fontRef>
+        </p:style>
+        <p:txBody>
+          <a:bodyPr rtlCol="0" anchor="ctr"/>
+          <a:lstStyle/>
+          <a:p>
+            <a:pPr algn="ctr"/>
+            <a:endParaRPr lang="en-US"/>
+          </a:p>
+        </p:txBody>
+      </p:sp>
+      <p:sp>
+        <p:nvSpPr>
+          <p:cNvPr id="5" name="Rounded Rectangle 4">
+            <a:extLst>
+              <a:ext uri="{FF2B5EF4-FFF2-40B4-BE49-F238E27FC236}">
+                <a16:creationId xmlns:a16="http://schemas.microsoft.com/office/drawing/2014/main" id="{376C7AA9-F7B5-DF4E-A2F2-F42E758583B5}"/>
+              </a:ext>
+            </a:extLst>
+          </p:cNvPr>
+          <p:cNvSpPr/>
+          <p:nvPr/>
+        </p:nvSpPr>
+        <p:spPr>
+          <a:xfrm>
+            <a:off x="6259492" y="798651"/>
+            <a:ext cx="2847372" cy="2592729"/>
+          </a:xfrm>
+          <a:prstGeom prst="roundRect">
+            <a:avLst/>
+          </a:prstGeom>
+          <a:solidFill>
+            <a:schemeClr val="bg1"/>
+          </a:solidFill>
+          <a:ln w="25400">
+            <a:solidFill>
+              <a:schemeClr val="tx1"/>
+            </a:solidFill>
+          </a:ln>
+          <a:effectLst>
+            <a:outerShdw blurRad="50800" dist="38100" dir="2700000" algn="tl" rotWithShape="0">
+              <a:prstClr val="black">
+                <a:alpha val="40000"/>
+              </a:prstClr>
+            </a:outerShdw>
+          </a:effectLst>
+        </p:spPr>
+        <p:style>
+          <a:lnRef idx="2">
+            <a:schemeClr val="accent1">
+              <a:shade val="50000"/>
+            </a:schemeClr>
+          </a:lnRef>
+          <a:fillRef idx="1">
+            <a:schemeClr val="accent1"/>
+          </a:fillRef>
+          <a:effectRef idx="0">
+            <a:schemeClr val="accent1"/>
+          </a:effectRef>
+          <a:fontRef idx="minor">
+            <a:schemeClr val="lt1"/>
+          </a:fontRef>
+        </p:style>
+        <p:txBody>
+          <a:bodyPr rtlCol="0" anchor="ctr"/>
+          <a:lstStyle/>
+          <a:p>
+            <a:pPr algn="ctr"/>
+            <a:endParaRPr lang="en-US"/>
+          </a:p>
+        </p:txBody>
+      </p:sp>
+      <p:sp>
+        <p:nvSpPr>
+          <p:cNvPr id="8" name="TextBox 7">
+            <a:extLst>
+              <a:ext uri="{FF2B5EF4-FFF2-40B4-BE49-F238E27FC236}">
+                <a16:creationId xmlns:a16="http://schemas.microsoft.com/office/drawing/2014/main" id="{C7137D25-25A9-654E-A6EA-35DBAAFC9423}"/>
+              </a:ext>
+            </a:extLst>
+          </p:cNvPr>
+          <p:cNvSpPr txBox="1"/>
+          <p:nvPr/>
+        </p:nvSpPr>
+        <p:spPr>
+          <a:xfrm>
+            <a:off x="4259371" y="1833404"/>
+            <a:ext cx="370614" cy="523220"/>
+          </a:xfrm>
+          <a:prstGeom prst="rect">
+            <a:avLst/>
+          </a:prstGeom>
+          <a:noFill/>
+        </p:spPr>
+        <p:txBody>
+          <a:bodyPr wrap="none" rtlCol="0">
+            <a:spAutoFit/>
+          </a:bodyPr>
+          <a:lstStyle/>
+          <a:p>
+            <a:r>
+              <a:rPr lang="en-US" sz="2800" dirty="0"/>
+              <a:t>X</a:t>
+            </a:r>
+          </a:p>
+        </p:txBody>
+      </p:sp>
+      <p:cxnSp>
+        <p:nvCxnSpPr>
+          <p:cNvPr id="14" name="Straight Arrow Connector 13">
+            <a:extLst>
+              <a:ext uri="{FF2B5EF4-FFF2-40B4-BE49-F238E27FC236}">
+                <a16:creationId xmlns:a16="http://schemas.microsoft.com/office/drawing/2014/main" id="{A4E22BF7-1C79-8A40-95F0-F78833575F53}"/>
+              </a:ext>
+            </a:extLst>
+          </p:cNvPr>
+          <p:cNvCxnSpPr>
+            <a:cxnSpLocks/>
+          </p:cNvCxnSpPr>
+          <p:nvPr/>
+        </p:nvCxnSpPr>
+        <p:spPr>
+          <a:xfrm>
+            <a:off x="3020992" y="3693771"/>
+            <a:ext cx="6085872" cy="0"/>
+          </a:xfrm>
+          <a:prstGeom prst="straightConnector1">
+            <a:avLst/>
+          </a:prstGeom>
+          <a:ln w="60325">
+            <a:solidFill>
+              <a:schemeClr val="tx1"/>
+            </a:solidFill>
+            <a:tailEnd type="triangle"/>
+          </a:ln>
+          <a:effectLst>
+            <a:outerShdw blurRad="50800" dist="38100" dir="2700000" algn="tl" rotWithShape="0">
+              <a:prstClr val="black">
+                <a:alpha val="40000"/>
+              </a:prstClr>
+            </a:outerShdw>
+          </a:effectLst>
+        </p:spPr>
+        <p:style>
+          <a:lnRef idx="1">
+            <a:schemeClr val="accent1"/>
+          </a:lnRef>
+          <a:fillRef idx="0">
+            <a:schemeClr val="accent1"/>
+          </a:fillRef>
+          <a:effectRef idx="0">
+            <a:schemeClr val="accent1"/>
+          </a:effectRef>
+          <a:fontRef idx="minor">
+            <a:schemeClr val="tx1"/>
+          </a:fontRef>
+        </p:style>
+      </p:cxnSp>
+      <p:sp>
+        <p:nvSpPr>
+          <p:cNvPr id="15" name="TextBox 14">
+            <a:extLst>
+              <a:ext uri="{FF2B5EF4-FFF2-40B4-BE49-F238E27FC236}">
+                <a16:creationId xmlns:a16="http://schemas.microsoft.com/office/drawing/2014/main" id="{50E541D9-B439-874C-A5A7-E76532089C44}"/>
+              </a:ext>
+            </a:extLst>
+          </p:cNvPr>
+          <p:cNvSpPr txBox="1"/>
+          <p:nvPr/>
+        </p:nvSpPr>
+        <p:spPr>
+          <a:xfrm>
+            <a:off x="3766800" y="3811495"/>
+            <a:ext cx="1355756" cy="369332"/>
+          </a:xfrm>
+          <a:prstGeom prst="rect">
+            <a:avLst/>
+          </a:prstGeom>
+          <a:noFill/>
+        </p:spPr>
+        <p:txBody>
+          <a:bodyPr wrap="none" rtlCol="0">
+            <a:spAutoFit/>
+          </a:bodyPr>
+          <a:lstStyle/>
+          <a:p>
+            <a:r>
+              <a:rPr lang="en-US" dirty="0"/>
+              <a:t>Display Start</a:t>
+            </a:r>
+          </a:p>
+        </p:txBody>
+      </p:sp>
+      <p:sp>
+        <p:nvSpPr>
+          <p:cNvPr id="19" name="TextBox 18">
+            <a:extLst>
+              <a:ext uri="{FF2B5EF4-FFF2-40B4-BE49-F238E27FC236}">
+                <a16:creationId xmlns:a16="http://schemas.microsoft.com/office/drawing/2014/main" id="{0C8F5B31-C805-7944-91FE-5A438061E29C}"/>
+              </a:ext>
+            </a:extLst>
+          </p:cNvPr>
+          <p:cNvSpPr txBox="1"/>
+          <p:nvPr/>
+        </p:nvSpPr>
+        <p:spPr>
+          <a:xfrm>
+            <a:off x="6879015" y="3826196"/>
+            <a:ext cx="1608325" cy="369332"/>
+          </a:xfrm>
+          <a:prstGeom prst="rect">
+            <a:avLst/>
+          </a:prstGeom>
+          <a:noFill/>
+        </p:spPr>
+        <p:txBody>
+          <a:bodyPr wrap="none" rtlCol="0">
+            <a:spAutoFit/>
+          </a:bodyPr>
+          <a:lstStyle/>
+          <a:p>
+            <a:r>
+              <a:rPr lang="en-US" dirty="0"/>
+              <a:t>Display Change</a:t>
+            </a:r>
+          </a:p>
+        </p:txBody>
+      </p:sp>
+      <p:sp>
+        <p:nvSpPr>
+          <p:cNvPr id="20" name="TextBox 19">
+            <a:extLst>
+              <a:ext uri="{FF2B5EF4-FFF2-40B4-BE49-F238E27FC236}">
+                <a16:creationId xmlns:a16="http://schemas.microsoft.com/office/drawing/2014/main" id="{750B2AF3-E3CE-6246-A251-B874D4CBD889}"/>
+              </a:ext>
+            </a:extLst>
+          </p:cNvPr>
+          <p:cNvSpPr txBox="1"/>
+          <p:nvPr/>
+        </p:nvSpPr>
+        <p:spPr>
+          <a:xfrm>
+            <a:off x="9206878" y="3391380"/>
+            <a:ext cx="1191168" cy="646331"/>
+          </a:xfrm>
+          <a:prstGeom prst="rect">
+            <a:avLst/>
+          </a:prstGeom>
+          <a:noFill/>
+        </p:spPr>
+        <p:txBody>
+          <a:bodyPr wrap="square" rtlCol="0">
+            <a:spAutoFit/>
+          </a:bodyPr>
+          <a:lstStyle/>
+          <a:p>
+            <a:pPr algn="ctr"/>
+            <a:r>
+              <a:rPr lang="en-US" dirty="0"/>
+              <a:t>Participant Response</a:t>
+            </a:r>
+          </a:p>
+        </p:txBody>
+      </p:sp>
+      <p:sp>
+        <p:nvSpPr>
+          <p:cNvPr id="21" name="TextBox 20">
+            <a:extLst>
+              <a:ext uri="{FF2B5EF4-FFF2-40B4-BE49-F238E27FC236}">
+                <a16:creationId xmlns:a16="http://schemas.microsoft.com/office/drawing/2014/main" id="{7679C256-E4AF-0C43-8D81-F71A8311EE1B}"/>
+              </a:ext>
+            </a:extLst>
+          </p:cNvPr>
+          <p:cNvSpPr txBox="1"/>
+          <p:nvPr/>
+        </p:nvSpPr>
+        <p:spPr>
+          <a:xfrm>
+            <a:off x="7202273" y="1310184"/>
+            <a:ext cx="335348" cy="523220"/>
+          </a:xfrm>
+          <a:prstGeom prst="rect">
+            <a:avLst/>
+          </a:prstGeom>
+          <a:noFill/>
+        </p:spPr>
+        <p:txBody>
+          <a:bodyPr wrap="none" rtlCol="0">
+            <a:spAutoFit/>
+          </a:bodyPr>
+          <a:lstStyle/>
+          <a:p>
+            <a:r>
+              <a:rPr lang="en-US" sz="2800" dirty="0"/>
+              <a:t>L</a:t>
+            </a:r>
+          </a:p>
+        </p:txBody>
+      </p:sp>
+      <p:sp>
+        <p:nvSpPr>
+          <p:cNvPr id="22" name="TextBox 21">
+            <a:extLst>
+              <a:ext uri="{FF2B5EF4-FFF2-40B4-BE49-F238E27FC236}">
+                <a16:creationId xmlns:a16="http://schemas.microsoft.com/office/drawing/2014/main" id="{027223A0-EB5D-3842-9CA3-4BB6EF9143BD}"/>
+              </a:ext>
+            </a:extLst>
+          </p:cNvPr>
+          <p:cNvSpPr txBox="1"/>
+          <p:nvPr/>
+        </p:nvSpPr>
+        <p:spPr>
+          <a:xfrm>
+            <a:off x="8180599" y="1833404"/>
+            <a:ext cx="335348" cy="523220"/>
+          </a:xfrm>
+          <a:prstGeom prst="rect">
+            <a:avLst/>
+          </a:prstGeom>
+          <a:noFill/>
+        </p:spPr>
+        <p:txBody>
+          <a:bodyPr wrap="none" rtlCol="0">
+            <a:spAutoFit/>
+          </a:bodyPr>
+          <a:lstStyle/>
+          <a:p>
+            <a:r>
+              <a:rPr lang="en-US" sz="2800" dirty="0"/>
+              <a:t>L</a:t>
+            </a:r>
+          </a:p>
+        </p:txBody>
+      </p:sp>
+      <p:sp>
+        <p:nvSpPr>
+          <p:cNvPr id="23" name="TextBox 22">
+            <a:extLst>
+              <a:ext uri="{FF2B5EF4-FFF2-40B4-BE49-F238E27FC236}">
+                <a16:creationId xmlns:a16="http://schemas.microsoft.com/office/drawing/2014/main" id="{E14D6871-4D68-C946-A2E5-567DDD050BA9}"/>
+              </a:ext>
+            </a:extLst>
+          </p:cNvPr>
+          <p:cNvSpPr txBox="1"/>
+          <p:nvPr/>
+        </p:nvSpPr>
+        <p:spPr>
+          <a:xfrm>
+            <a:off x="6866925" y="2344937"/>
+            <a:ext cx="335348" cy="523220"/>
+          </a:xfrm>
+          <a:prstGeom prst="rect">
+            <a:avLst/>
+          </a:prstGeom>
+          <a:noFill/>
+        </p:spPr>
+        <p:txBody>
+          <a:bodyPr wrap="none" rtlCol="0">
+            <a:spAutoFit/>
+          </a:bodyPr>
+          <a:lstStyle/>
+          <a:p>
+            <a:r>
+              <a:rPr lang="en-US" sz="2800" dirty="0"/>
+              <a:t>L</a:t>
+            </a:r>
+          </a:p>
+        </p:txBody>
+      </p:sp>
+      <p:sp>
+        <p:nvSpPr>
+          <p:cNvPr id="24" name="TextBox 23">
+            <a:extLst>
+              <a:ext uri="{FF2B5EF4-FFF2-40B4-BE49-F238E27FC236}">
+                <a16:creationId xmlns:a16="http://schemas.microsoft.com/office/drawing/2014/main" id="{84073D70-B03C-024F-8FFB-24F17B22FE63}"/>
+              </a:ext>
+            </a:extLst>
+          </p:cNvPr>
+          <p:cNvSpPr txBox="1"/>
+          <p:nvPr/>
+        </p:nvSpPr>
+        <p:spPr>
+          <a:xfrm>
+            <a:off x="8142559" y="897379"/>
+            <a:ext cx="335348" cy="523220"/>
+          </a:xfrm>
+          <a:prstGeom prst="rect">
+            <a:avLst/>
+          </a:prstGeom>
+          <a:noFill/>
+        </p:spPr>
+        <p:txBody>
+          <a:bodyPr wrap="none" rtlCol="0">
+            <a:spAutoFit/>
+          </a:bodyPr>
+          <a:lstStyle/>
+          <a:p>
+            <a:r>
+              <a:rPr lang="en-US" sz="2800" dirty="0"/>
+              <a:t>L</a:t>
+            </a:r>
+          </a:p>
+        </p:txBody>
+      </p:sp>
+      <p:sp>
+        <p:nvSpPr>
+          <p:cNvPr id="26" name="Oval 25">
+            <a:extLst>
+              <a:ext uri="{FF2B5EF4-FFF2-40B4-BE49-F238E27FC236}">
+                <a16:creationId xmlns:a16="http://schemas.microsoft.com/office/drawing/2014/main" id="{4D487105-0BA9-2444-BE0F-D224733BEBD0}"/>
+              </a:ext>
+            </a:extLst>
+          </p:cNvPr>
+          <p:cNvSpPr/>
+          <p:nvPr/>
+        </p:nvSpPr>
+        <p:spPr>
+          <a:xfrm>
+            <a:off x="4384837" y="2095014"/>
+            <a:ext cx="196770" cy="196770"/>
+          </a:xfrm>
+          <a:prstGeom prst="ellipse">
+            <a:avLst/>
+          </a:prstGeom>
+          <a:solidFill>
+            <a:srgbClr val="FF0000"/>
+          </a:solidFill>
+          <a:ln>
+            <a:solidFill>
+              <a:schemeClr val="tx1"/>
+            </a:solidFill>
+          </a:ln>
+        </p:spPr>
+        <p:style>
+          <a:lnRef idx="2">
+            <a:schemeClr val="accent1">
+              <a:shade val="50000"/>
+            </a:schemeClr>
+          </a:lnRef>
+          <a:fillRef idx="1">
+            <a:schemeClr val="accent1"/>
+          </a:fillRef>
+          <a:effectRef idx="0">
+            <a:schemeClr val="accent1"/>
+          </a:effectRef>
+          <a:fontRef idx="minor">
+            <a:schemeClr val="lt1"/>
+          </a:fontRef>
+        </p:style>
+        <p:txBody>
+          <a:bodyPr rtlCol="0" anchor="ctr"/>
+          <a:lstStyle/>
+          <a:p>
+            <a:pPr algn="ctr"/>
+            <a:endParaRPr lang="en-US"/>
+          </a:p>
+        </p:txBody>
+      </p:sp>
+      <p:sp>
+        <p:nvSpPr>
+          <p:cNvPr id="29" name="Oval 28">
+            <a:extLst>
+              <a:ext uri="{FF2B5EF4-FFF2-40B4-BE49-F238E27FC236}">
+                <a16:creationId xmlns:a16="http://schemas.microsoft.com/office/drawing/2014/main" id="{B953A78A-BC3C-9644-B165-DCAB34839618}"/>
+              </a:ext>
+            </a:extLst>
+          </p:cNvPr>
+          <p:cNvSpPr/>
+          <p:nvPr/>
+        </p:nvSpPr>
+        <p:spPr>
+          <a:xfrm>
+            <a:off x="7683177" y="2095014"/>
+            <a:ext cx="196770" cy="196770"/>
+          </a:xfrm>
+          <a:prstGeom prst="ellipse">
+            <a:avLst/>
+          </a:prstGeom>
+          <a:solidFill>
+            <a:srgbClr val="FF0000"/>
+          </a:solidFill>
+          <a:ln>
+            <a:solidFill>
+              <a:schemeClr val="tx1"/>
+            </a:solidFill>
+          </a:ln>
+        </p:spPr>
+        <p:style>
+          <a:lnRef idx="2">
+            <a:schemeClr val="accent1">
+              <a:shade val="50000"/>
+            </a:schemeClr>
+          </a:lnRef>
+          <a:fillRef idx="1">
+            <a:schemeClr val="accent1"/>
+          </a:fillRef>
+          <a:effectRef idx="0">
+            <a:schemeClr val="accent1"/>
+          </a:effectRef>
+          <a:fontRef idx="minor">
+            <a:schemeClr val="lt1"/>
+          </a:fontRef>
+        </p:style>
+        <p:txBody>
+          <a:bodyPr rtlCol="0" anchor="ctr"/>
+          <a:lstStyle/>
+          <a:p>
+            <a:pPr algn="ctr"/>
+            <a:endParaRPr lang="en-US"/>
+          </a:p>
+        </p:txBody>
+      </p:sp>
+    </p:spTree>
+    <p:extLst>
+      <p:ext uri="{BB962C8B-B14F-4D97-AF65-F5344CB8AC3E}">
+        <p14:creationId xmlns:p14="http://schemas.microsoft.com/office/powerpoint/2010/main" val="2844913735"/>
+      </p:ext>
+    </p:extLst>
+  </p:cSld>
+  <p:clrMapOvr>
+    <a:masterClrMapping/>
+  </p:clrMapOvr>
+</p:sld>
+</file>
+
 <file path=ppt/theme/theme1.xml><?xml version="1.0" encoding="utf-8"?>
 <a:theme xmlns:a="http://schemas.openxmlformats.org/drawingml/2006/main" name="Office Theme">
   <a:themeElements>

</xml_diff>

<commit_message>
Updates to bookdown guide
More updates to bookdown guide
</commit_message>
<xml_diff>
--- a/bookdown source/files/ppt/Examples for Bookdown.pptx
+++ b/bookdown source/files/ppt/Examples for Bookdown.pptx
@@ -7,7 +7,8 @@
   <p:sldIdLst>
     <p:sldId id="256" r:id="rId2"/>
     <p:sldId id="257" r:id="rId3"/>
-    <p:sldId id="258" r:id="rId4"/>
+    <p:sldId id="259" r:id="rId4"/>
+    <p:sldId id="258" r:id="rId5"/>
   </p:sldIdLst>
   <p:sldSz cx="12192000" cy="6858000"/>
   <p:notesSz cx="6858000" cy="9144000"/>
@@ -261,7 +262,7 @@
           <a:p>
             <a:fld id="{63889709-0435-BE4C-897A-4998963CC9D4}" type="datetimeFigureOut">
               <a:rPr lang="en-US" smtClean="0"/>
-              <a:t>10/23/19</a:t>
+              <a:t>10/29/19</a:t>
             </a:fld>
             <a:endParaRPr lang="en-US"/>
           </a:p>
@@ -459,7 +460,7 @@
           <a:p>
             <a:fld id="{63889709-0435-BE4C-897A-4998963CC9D4}" type="datetimeFigureOut">
               <a:rPr lang="en-US" smtClean="0"/>
-              <a:t>10/23/19</a:t>
+              <a:t>10/29/19</a:t>
             </a:fld>
             <a:endParaRPr lang="en-US"/>
           </a:p>
@@ -667,7 +668,7 @@
           <a:p>
             <a:fld id="{63889709-0435-BE4C-897A-4998963CC9D4}" type="datetimeFigureOut">
               <a:rPr lang="en-US" smtClean="0"/>
-              <a:t>10/23/19</a:t>
+              <a:t>10/29/19</a:t>
             </a:fld>
             <a:endParaRPr lang="en-US"/>
           </a:p>
@@ -865,7 +866,7 @@
           <a:p>
             <a:fld id="{63889709-0435-BE4C-897A-4998963CC9D4}" type="datetimeFigureOut">
               <a:rPr lang="en-US" smtClean="0"/>
-              <a:t>10/23/19</a:t>
+              <a:t>10/29/19</a:t>
             </a:fld>
             <a:endParaRPr lang="en-US"/>
           </a:p>
@@ -1140,7 +1141,7 @@
           <a:p>
             <a:fld id="{63889709-0435-BE4C-897A-4998963CC9D4}" type="datetimeFigureOut">
               <a:rPr lang="en-US" smtClean="0"/>
-              <a:t>10/23/19</a:t>
+              <a:t>10/29/19</a:t>
             </a:fld>
             <a:endParaRPr lang="en-US"/>
           </a:p>
@@ -1405,7 +1406,7 @@
           <a:p>
             <a:fld id="{63889709-0435-BE4C-897A-4998963CC9D4}" type="datetimeFigureOut">
               <a:rPr lang="en-US" smtClean="0"/>
-              <a:t>10/23/19</a:t>
+              <a:t>10/29/19</a:t>
             </a:fld>
             <a:endParaRPr lang="en-US"/>
           </a:p>
@@ -1817,7 +1818,7 @@
           <a:p>
             <a:fld id="{63889709-0435-BE4C-897A-4998963CC9D4}" type="datetimeFigureOut">
               <a:rPr lang="en-US" smtClean="0"/>
-              <a:t>10/23/19</a:t>
+              <a:t>10/29/19</a:t>
             </a:fld>
             <a:endParaRPr lang="en-US"/>
           </a:p>
@@ -1958,7 +1959,7 @@
           <a:p>
             <a:fld id="{63889709-0435-BE4C-897A-4998963CC9D4}" type="datetimeFigureOut">
               <a:rPr lang="en-US" smtClean="0"/>
-              <a:t>10/23/19</a:t>
+              <a:t>10/29/19</a:t>
             </a:fld>
             <a:endParaRPr lang="en-US"/>
           </a:p>
@@ -2071,7 +2072,7 @@
           <a:p>
             <a:fld id="{63889709-0435-BE4C-897A-4998963CC9D4}" type="datetimeFigureOut">
               <a:rPr lang="en-US" smtClean="0"/>
-              <a:t>10/23/19</a:t>
+              <a:t>10/29/19</a:t>
             </a:fld>
             <a:endParaRPr lang="en-US"/>
           </a:p>
@@ -2382,7 +2383,7 @@
           <a:p>
             <a:fld id="{63889709-0435-BE4C-897A-4998963CC9D4}" type="datetimeFigureOut">
               <a:rPr lang="en-US" smtClean="0"/>
-              <a:t>10/23/19</a:t>
+              <a:t>10/29/19</a:t>
             </a:fld>
             <a:endParaRPr lang="en-US"/>
           </a:p>
@@ -2670,7 +2671,7 @@
           <a:p>
             <a:fld id="{63889709-0435-BE4C-897A-4998963CC9D4}" type="datetimeFigureOut">
               <a:rPr lang="en-US" smtClean="0"/>
-              <a:t>10/23/19</a:t>
+              <a:t>10/29/19</a:t>
             </a:fld>
             <a:endParaRPr lang="en-US"/>
           </a:p>
@@ -2911,7 +2912,7 @@
           <a:p>
             <a:fld id="{63889709-0435-BE4C-897A-4998963CC9D4}" type="datetimeFigureOut">
               <a:rPr lang="en-US" smtClean="0"/>
-              <a:t>10/23/19</a:t>
+              <a:t>10/29/19</a:t>
             </a:fld>
             <a:endParaRPr lang="en-US"/>
           </a:p>
@@ -3496,13 +3497,14 @@
           </p:cNvPr>
           <p:cNvCxnSpPr>
             <a:cxnSpLocks/>
+            <a:endCxn id="20" idx="1"/>
           </p:cNvCxnSpPr>
           <p:nvPr/>
         </p:nvCxnSpPr>
         <p:spPr>
           <a:xfrm>
             <a:off x="3020992" y="3693771"/>
-            <a:ext cx="6085872" cy="0"/>
+            <a:ext cx="6420401" cy="20775"/>
           </a:xfrm>
           <a:prstGeom prst="straightConnector1">
             <a:avLst/>
@@ -3620,7 +3622,7 @@
         </p:nvSpPr>
         <p:spPr>
           <a:xfrm>
-            <a:off x="9206878" y="3391380"/>
+            <a:off x="9441393" y="3391380"/>
             <a:ext cx="1191168" cy="646331"/>
           </a:xfrm>
           <a:prstGeom prst="rect">
@@ -3778,6 +3780,371 @@
             <a:r>
               <a:rPr lang="en-US" sz="2800" dirty="0"/>
               <a:t>L</a:t>
+            </a:r>
+          </a:p>
+        </p:txBody>
+      </p:sp>
+      <p:sp>
+        <p:nvSpPr>
+          <p:cNvPr id="2" name="TextBox 1">
+            <a:extLst>
+              <a:ext uri="{FF2B5EF4-FFF2-40B4-BE49-F238E27FC236}">
+                <a16:creationId xmlns:a16="http://schemas.microsoft.com/office/drawing/2014/main" id="{9AF2EA17-F614-D142-996B-642015627852}"/>
+              </a:ext>
+            </a:extLst>
+          </p:cNvPr>
+          <p:cNvSpPr txBox="1"/>
+          <p:nvPr/>
+        </p:nvSpPr>
+        <p:spPr>
+          <a:xfrm>
+            <a:off x="3553953" y="5421421"/>
+            <a:ext cx="1781450" cy="400110"/>
+          </a:xfrm>
+          <a:prstGeom prst="rect">
+            <a:avLst/>
+          </a:prstGeom>
+          <a:noFill/>
+        </p:spPr>
+        <p:txBody>
+          <a:bodyPr wrap="none" rtlCol="0">
+            <a:spAutoFit/>
+          </a:bodyPr>
+          <a:lstStyle/>
+          <a:p>
+            <a:r>
+              <a:rPr lang="en-US" sz="2000" dirty="0">
+                <a:solidFill>
+                  <a:schemeClr val="accent6">
+                    <a:lumMod val="50000"/>
+                  </a:schemeClr>
+                </a:solidFill>
+              </a:rPr>
+              <a:t>DISPLAY_START</a:t>
+            </a:r>
+          </a:p>
+        </p:txBody>
+      </p:sp>
+      <p:sp>
+        <p:nvSpPr>
+          <p:cNvPr id="16" name="TextBox 15">
+            <a:extLst>
+              <a:ext uri="{FF2B5EF4-FFF2-40B4-BE49-F238E27FC236}">
+                <a16:creationId xmlns:a16="http://schemas.microsoft.com/office/drawing/2014/main" id="{89ABBFC3-0851-4345-B8C4-44C6F343B906}"/>
+              </a:ext>
+            </a:extLst>
+          </p:cNvPr>
+          <p:cNvSpPr txBox="1"/>
+          <p:nvPr/>
+        </p:nvSpPr>
+        <p:spPr>
+          <a:xfrm>
+            <a:off x="6660076" y="5407612"/>
+            <a:ext cx="2046201" cy="400110"/>
+          </a:xfrm>
+          <a:prstGeom prst="rect">
+            <a:avLst/>
+          </a:prstGeom>
+          <a:noFill/>
+        </p:spPr>
+        <p:txBody>
+          <a:bodyPr wrap="none" rtlCol="0">
+            <a:spAutoFit/>
+          </a:bodyPr>
+          <a:lstStyle/>
+          <a:p>
+            <a:r>
+              <a:rPr lang="en-US" sz="2000" dirty="0">
+                <a:solidFill>
+                  <a:schemeClr val="accent6">
+                    <a:lumMod val="50000"/>
+                  </a:schemeClr>
+                </a:solidFill>
+              </a:rPr>
+              <a:t>DISPLAY_CHANGE</a:t>
+            </a:r>
+          </a:p>
+        </p:txBody>
+      </p:sp>
+      <p:sp>
+        <p:nvSpPr>
+          <p:cNvPr id="17" name="TextBox 16">
+            <a:extLst>
+              <a:ext uri="{FF2B5EF4-FFF2-40B4-BE49-F238E27FC236}">
+                <a16:creationId xmlns:a16="http://schemas.microsoft.com/office/drawing/2014/main" id="{39C6ECE4-BED6-644A-BCD6-D3B51FAFB504}"/>
+              </a:ext>
+            </a:extLst>
+          </p:cNvPr>
+          <p:cNvSpPr txBox="1"/>
+          <p:nvPr/>
+        </p:nvSpPr>
+        <p:spPr>
+          <a:xfrm>
+            <a:off x="9121406" y="5407612"/>
+            <a:ext cx="1831142" cy="400110"/>
+          </a:xfrm>
+          <a:prstGeom prst="rect">
+            <a:avLst/>
+          </a:prstGeom>
+          <a:noFill/>
+        </p:spPr>
+        <p:txBody>
+          <a:bodyPr wrap="none" rtlCol="0">
+            <a:spAutoFit/>
+          </a:bodyPr>
+          <a:lstStyle/>
+          <a:p>
+            <a:r>
+              <a:rPr lang="en-US" sz="2000" dirty="0">
+                <a:solidFill>
+                  <a:schemeClr val="accent6">
+                    <a:lumMod val="50000"/>
+                  </a:schemeClr>
+                </a:solidFill>
+              </a:rPr>
+              <a:t>BUTTON_PRESS</a:t>
+            </a:r>
+          </a:p>
+        </p:txBody>
+      </p:sp>
+      <p:cxnSp>
+        <p:nvCxnSpPr>
+          <p:cNvPr id="7" name="Straight Arrow Connector 6">
+            <a:extLst>
+              <a:ext uri="{FF2B5EF4-FFF2-40B4-BE49-F238E27FC236}">
+                <a16:creationId xmlns:a16="http://schemas.microsoft.com/office/drawing/2014/main" id="{6CB1FDC9-EEB6-A042-A5FF-55B94573C737}"/>
+              </a:ext>
+            </a:extLst>
+          </p:cNvPr>
+          <p:cNvCxnSpPr>
+            <a:endCxn id="2" idx="0"/>
+          </p:cNvCxnSpPr>
+          <p:nvPr/>
+        </p:nvCxnSpPr>
+        <p:spPr>
+          <a:xfrm>
+            <a:off x="4444678" y="4375230"/>
+            <a:ext cx="0" cy="1046191"/>
+          </a:xfrm>
+          <a:prstGeom prst="straightConnector1">
+            <a:avLst/>
+          </a:prstGeom>
+          <a:ln w="60325">
+            <a:solidFill>
+              <a:schemeClr val="accent6">
+                <a:lumMod val="50000"/>
+              </a:schemeClr>
+            </a:solidFill>
+            <a:prstDash val="sysDot"/>
+            <a:tailEnd type="triangle"/>
+          </a:ln>
+        </p:spPr>
+        <p:style>
+          <a:lnRef idx="1">
+            <a:schemeClr val="dk1"/>
+          </a:lnRef>
+          <a:fillRef idx="0">
+            <a:schemeClr val="dk1"/>
+          </a:fillRef>
+          <a:effectRef idx="0">
+            <a:schemeClr val="dk1"/>
+          </a:effectRef>
+          <a:fontRef idx="minor">
+            <a:schemeClr val="tx1"/>
+          </a:fontRef>
+        </p:style>
+      </p:cxnSp>
+      <p:cxnSp>
+        <p:nvCxnSpPr>
+          <p:cNvPr id="25" name="Straight Arrow Connector 24">
+            <a:extLst>
+              <a:ext uri="{FF2B5EF4-FFF2-40B4-BE49-F238E27FC236}">
+                <a16:creationId xmlns:a16="http://schemas.microsoft.com/office/drawing/2014/main" id="{3AD39F45-3B81-5E4C-8DC0-22E34EC67FF6}"/>
+              </a:ext>
+            </a:extLst>
+          </p:cNvPr>
+          <p:cNvCxnSpPr/>
+          <p:nvPr/>
+        </p:nvCxnSpPr>
+        <p:spPr>
+          <a:xfrm>
+            <a:off x="7679679" y="4361421"/>
+            <a:ext cx="0" cy="1046191"/>
+          </a:xfrm>
+          <a:prstGeom prst="straightConnector1">
+            <a:avLst/>
+          </a:prstGeom>
+          <a:ln w="60325">
+            <a:solidFill>
+              <a:schemeClr val="accent6">
+                <a:lumMod val="50000"/>
+              </a:schemeClr>
+            </a:solidFill>
+            <a:prstDash val="sysDot"/>
+            <a:tailEnd type="triangle"/>
+          </a:ln>
+        </p:spPr>
+        <p:style>
+          <a:lnRef idx="1">
+            <a:schemeClr val="dk1"/>
+          </a:lnRef>
+          <a:fillRef idx="0">
+            <a:schemeClr val="dk1"/>
+          </a:fillRef>
+          <a:effectRef idx="0">
+            <a:schemeClr val="dk1"/>
+          </a:effectRef>
+          <a:fontRef idx="minor">
+            <a:schemeClr val="tx1"/>
+          </a:fontRef>
+        </p:style>
+      </p:cxnSp>
+      <p:cxnSp>
+        <p:nvCxnSpPr>
+          <p:cNvPr id="26" name="Straight Arrow Connector 25">
+            <a:extLst>
+              <a:ext uri="{FF2B5EF4-FFF2-40B4-BE49-F238E27FC236}">
+                <a16:creationId xmlns:a16="http://schemas.microsoft.com/office/drawing/2014/main" id="{4A9EF4D9-B3A5-2248-AE21-66C4A7649F51}"/>
+              </a:ext>
+            </a:extLst>
+          </p:cNvPr>
+          <p:cNvCxnSpPr/>
+          <p:nvPr/>
+        </p:nvCxnSpPr>
+        <p:spPr>
+          <a:xfrm>
+            <a:off x="10083736" y="4369962"/>
+            <a:ext cx="0" cy="1046191"/>
+          </a:xfrm>
+          <a:prstGeom prst="straightConnector1">
+            <a:avLst/>
+          </a:prstGeom>
+          <a:ln w="60325">
+            <a:solidFill>
+              <a:schemeClr val="accent6">
+                <a:lumMod val="50000"/>
+              </a:schemeClr>
+            </a:solidFill>
+            <a:prstDash val="sysDot"/>
+            <a:tailEnd type="triangle"/>
+          </a:ln>
+        </p:spPr>
+        <p:style>
+          <a:lnRef idx="1">
+            <a:schemeClr val="dk1"/>
+          </a:lnRef>
+          <a:fillRef idx="0">
+            <a:schemeClr val="dk1"/>
+          </a:fillRef>
+          <a:effectRef idx="0">
+            <a:schemeClr val="dk1"/>
+          </a:effectRef>
+          <a:fontRef idx="minor">
+            <a:schemeClr val="tx1"/>
+          </a:fontRef>
+        </p:style>
+      </p:cxnSp>
+      <p:sp>
+        <p:nvSpPr>
+          <p:cNvPr id="9" name="TextBox 8">
+            <a:extLst>
+              <a:ext uri="{FF2B5EF4-FFF2-40B4-BE49-F238E27FC236}">
+                <a16:creationId xmlns:a16="http://schemas.microsoft.com/office/drawing/2014/main" id="{3D552ABA-E13B-D742-B688-A3DD29DE0583}"/>
+              </a:ext>
+            </a:extLst>
+          </p:cNvPr>
+          <p:cNvSpPr txBox="1"/>
+          <p:nvPr/>
+        </p:nvSpPr>
+        <p:spPr>
+          <a:xfrm>
+            <a:off x="4467397" y="4699850"/>
+            <a:ext cx="1009892" cy="369332"/>
+          </a:xfrm>
+          <a:prstGeom prst="rect">
+            <a:avLst/>
+          </a:prstGeom>
+          <a:noFill/>
+        </p:spPr>
+        <p:txBody>
+          <a:bodyPr wrap="none" rtlCol="0">
+            <a:spAutoFit/>
+          </a:bodyPr>
+          <a:lstStyle/>
+          <a:p>
+            <a:r>
+              <a:rPr lang="en-US" dirty="0"/>
+              <a:t>Message</a:t>
+            </a:r>
+          </a:p>
+        </p:txBody>
+      </p:sp>
+      <p:sp>
+        <p:nvSpPr>
+          <p:cNvPr id="27" name="TextBox 26">
+            <a:extLst>
+              <a:ext uri="{FF2B5EF4-FFF2-40B4-BE49-F238E27FC236}">
+                <a16:creationId xmlns:a16="http://schemas.microsoft.com/office/drawing/2014/main" id="{4FE91708-5E36-174C-9F53-129705FB3CC0}"/>
+              </a:ext>
+            </a:extLst>
+          </p:cNvPr>
+          <p:cNvSpPr txBox="1"/>
+          <p:nvPr/>
+        </p:nvSpPr>
+        <p:spPr>
+          <a:xfrm>
+            <a:off x="7696385" y="4708392"/>
+            <a:ext cx="1009892" cy="369332"/>
+          </a:xfrm>
+          <a:prstGeom prst="rect">
+            <a:avLst/>
+          </a:prstGeom>
+          <a:noFill/>
+        </p:spPr>
+        <p:txBody>
+          <a:bodyPr wrap="none" rtlCol="0">
+            <a:spAutoFit/>
+          </a:bodyPr>
+          <a:lstStyle/>
+          <a:p>
+            <a:r>
+              <a:rPr lang="en-US" dirty="0"/>
+              <a:t>Message</a:t>
+            </a:r>
+          </a:p>
+        </p:txBody>
+      </p:sp>
+      <p:sp>
+        <p:nvSpPr>
+          <p:cNvPr id="28" name="TextBox 27">
+            <a:extLst>
+              <a:ext uri="{FF2B5EF4-FFF2-40B4-BE49-F238E27FC236}">
+                <a16:creationId xmlns:a16="http://schemas.microsoft.com/office/drawing/2014/main" id="{B0FA2F0D-DA92-544A-B68F-CA9C6367CCE0}"/>
+              </a:ext>
+            </a:extLst>
+          </p:cNvPr>
+          <p:cNvSpPr txBox="1"/>
+          <p:nvPr/>
+        </p:nvSpPr>
+        <p:spPr>
+          <a:xfrm>
+            <a:off x="10127615" y="4699850"/>
+            <a:ext cx="1009892" cy="369332"/>
+          </a:xfrm>
+          <a:prstGeom prst="rect">
+            <a:avLst/>
+          </a:prstGeom>
+          <a:noFill/>
+        </p:spPr>
+        <p:txBody>
+          <a:bodyPr wrap="none" rtlCol="0">
+            <a:spAutoFit/>
+          </a:bodyPr>
+          <a:lstStyle/>
+          <a:p>
+            <a:r>
+              <a:rPr lang="en-US" dirty="0"/>
+              <a:t>Message</a:t>
             </a:r>
           </a:p>
         </p:txBody>
@@ -4690,6 +5057,1232 @@
 </file>
 
 <file path=ppt/slides/slide3.xml><?xml version="1.0" encoding="utf-8"?>
+<p:sld xmlns:a="http://schemas.openxmlformats.org/drawingml/2006/main" xmlns:r="http://schemas.openxmlformats.org/officeDocument/2006/relationships" xmlns:p="http://schemas.openxmlformats.org/presentationml/2006/main">
+  <p:cSld>
+    <p:spTree>
+      <p:nvGrpSpPr>
+        <p:cNvPr id="1" name=""/>
+        <p:cNvGrpSpPr/>
+        <p:nvPr/>
+      </p:nvGrpSpPr>
+      <p:grpSpPr>
+        <a:xfrm>
+          <a:off x="0" y="0"/>
+          <a:ext cx="0" cy="0"/>
+          <a:chOff x="0" y="0"/>
+          <a:chExt cx="0" cy="0"/>
+        </a:xfrm>
+      </p:grpSpPr>
+      <p:sp>
+        <p:nvSpPr>
+          <p:cNvPr id="4" name="Rounded Rectangle 3">
+            <a:extLst>
+              <a:ext uri="{FF2B5EF4-FFF2-40B4-BE49-F238E27FC236}">
+                <a16:creationId xmlns:a16="http://schemas.microsoft.com/office/drawing/2014/main" id="{397B3896-358B-E347-8BDE-B5C6208FEE2F}"/>
+              </a:ext>
+            </a:extLst>
+          </p:cNvPr>
+          <p:cNvSpPr/>
+          <p:nvPr/>
+        </p:nvSpPr>
+        <p:spPr>
+          <a:xfrm>
+            <a:off x="3020992" y="798653"/>
+            <a:ext cx="2847372" cy="2592729"/>
+          </a:xfrm>
+          <a:prstGeom prst="roundRect">
+            <a:avLst/>
+          </a:prstGeom>
+          <a:solidFill>
+            <a:schemeClr val="bg1"/>
+          </a:solidFill>
+          <a:ln w="25400">
+            <a:solidFill>
+              <a:schemeClr val="tx1"/>
+            </a:solidFill>
+          </a:ln>
+          <a:effectLst>
+            <a:outerShdw blurRad="50800" dist="38100" dir="2700000" algn="tl" rotWithShape="0">
+              <a:prstClr val="black">
+                <a:alpha val="40000"/>
+              </a:prstClr>
+            </a:outerShdw>
+          </a:effectLst>
+        </p:spPr>
+        <p:style>
+          <a:lnRef idx="2">
+            <a:schemeClr val="accent1">
+              <a:shade val="50000"/>
+            </a:schemeClr>
+          </a:lnRef>
+          <a:fillRef idx="1">
+            <a:schemeClr val="accent1"/>
+          </a:fillRef>
+          <a:effectRef idx="0">
+            <a:schemeClr val="accent1"/>
+          </a:effectRef>
+          <a:fontRef idx="minor">
+            <a:schemeClr val="lt1"/>
+          </a:fontRef>
+        </p:style>
+        <p:txBody>
+          <a:bodyPr rtlCol="0" anchor="ctr"/>
+          <a:lstStyle/>
+          <a:p>
+            <a:pPr algn="ctr"/>
+            <a:endParaRPr lang="en-US"/>
+          </a:p>
+        </p:txBody>
+      </p:sp>
+      <p:sp>
+        <p:nvSpPr>
+          <p:cNvPr id="5" name="Rounded Rectangle 4">
+            <a:extLst>
+              <a:ext uri="{FF2B5EF4-FFF2-40B4-BE49-F238E27FC236}">
+                <a16:creationId xmlns:a16="http://schemas.microsoft.com/office/drawing/2014/main" id="{376C7AA9-F7B5-DF4E-A2F2-F42E758583B5}"/>
+              </a:ext>
+            </a:extLst>
+          </p:cNvPr>
+          <p:cNvSpPr/>
+          <p:nvPr/>
+        </p:nvSpPr>
+        <p:spPr>
+          <a:xfrm>
+            <a:off x="6259492" y="798651"/>
+            <a:ext cx="2847372" cy="2592729"/>
+          </a:xfrm>
+          <a:prstGeom prst="roundRect">
+            <a:avLst/>
+          </a:prstGeom>
+          <a:solidFill>
+            <a:schemeClr val="bg1"/>
+          </a:solidFill>
+          <a:ln w="25400">
+            <a:solidFill>
+              <a:schemeClr val="tx1"/>
+            </a:solidFill>
+          </a:ln>
+          <a:effectLst>
+            <a:outerShdw blurRad="50800" dist="38100" dir="2700000" algn="tl" rotWithShape="0">
+              <a:prstClr val="black">
+                <a:alpha val="40000"/>
+              </a:prstClr>
+            </a:outerShdw>
+          </a:effectLst>
+        </p:spPr>
+        <p:style>
+          <a:lnRef idx="2">
+            <a:schemeClr val="accent1">
+              <a:shade val="50000"/>
+            </a:schemeClr>
+          </a:lnRef>
+          <a:fillRef idx="1">
+            <a:schemeClr val="accent1"/>
+          </a:fillRef>
+          <a:effectRef idx="0">
+            <a:schemeClr val="accent1"/>
+          </a:effectRef>
+          <a:fontRef idx="minor">
+            <a:schemeClr val="lt1"/>
+          </a:fontRef>
+        </p:style>
+        <p:txBody>
+          <a:bodyPr rtlCol="0" anchor="ctr"/>
+          <a:lstStyle/>
+          <a:p>
+            <a:pPr algn="ctr"/>
+            <a:endParaRPr lang="en-US"/>
+          </a:p>
+        </p:txBody>
+      </p:sp>
+      <p:sp>
+        <p:nvSpPr>
+          <p:cNvPr id="8" name="TextBox 7">
+            <a:extLst>
+              <a:ext uri="{FF2B5EF4-FFF2-40B4-BE49-F238E27FC236}">
+                <a16:creationId xmlns:a16="http://schemas.microsoft.com/office/drawing/2014/main" id="{C7137D25-25A9-654E-A6EA-35DBAAFC9423}"/>
+              </a:ext>
+            </a:extLst>
+          </p:cNvPr>
+          <p:cNvSpPr txBox="1"/>
+          <p:nvPr/>
+        </p:nvSpPr>
+        <p:spPr>
+          <a:xfrm>
+            <a:off x="4259371" y="1833404"/>
+            <a:ext cx="370614" cy="523220"/>
+          </a:xfrm>
+          <a:prstGeom prst="rect">
+            <a:avLst/>
+          </a:prstGeom>
+          <a:noFill/>
+        </p:spPr>
+        <p:txBody>
+          <a:bodyPr wrap="none" rtlCol="0">
+            <a:spAutoFit/>
+          </a:bodyPr>
+          <a:lstStyle/>
+          <a:p>
+            <a:r>
+              <a:rPr lang="en-US" sz="2800" dirty="0"/>
+              <a:t>X</a:t>
+            </a:r>
+          </a:p>
+        </p:txBody>
+      </p:sp>
+      <p:cxnSp>
+        <p:nvCxnSpPr>
+          <p:cNvPr id="14" name="Straight Arrow Connector 13">
+            <a:extLst>
+              <a:ext uri="{FF2B5EF4-FFF2-40B4-BE49-F238E27FC236}">
+                <a16:creationId xmlns:a16="http://schemas.microsoft.com/office/drawing/2014/main" id="{A4E22BF7-1C79-8A40-95F0-F78833575F53}"/>
+              </a:ext>
+            </a:extLst>
+          </p:cNvPr>
+          <p:cNvCxnSpPr>
+            <a:cxnSpLocks/>
+          </p:cNvCxnSpPr>
+          <p:nvPr/>
+        </p:nvCxnSpPr>
+        <p:spPr>
+          <a:xfrm>
+            <a:off x="3020992" y="3693771"/>
+            <a:ext cx="6085872" cy="0"/>
+          </a:xfrm>
+          <a:prstGeom prst="straightConnector1">
+            <a:avLst/>
+          </a:prstGeom>
+          <a:ln w="60325">
+            <a:solidFill>
+              <a:schemeClr val="tx1"/>
+            </a:solidFill>
+            <a:tailEnd type="triangle"/>
+          </a:ln>
+          <a:effectLst>
+            <a:outerShdw blurRad="50800" dist="38100" dir="2700000" algn="tl" rotWithShape="0">
+              <a:prstClr val="black">
+                <a:alpha val="40000"/>
+              </a:prstClr>
+            </a:outerShdw>
+          </a:effectLst>
+        </p:spPr>
+        <p:style>
+          <a:lnRef idx="1">
+            <a:schemeClr val="accent1"/>
+          </a:lnRef>
+          <a:fillRef idx="0">
+            <a:schemeClr val="accent1"/>
+          </a:fillRef>
+          <a:effectRef idx="0">
+            <a:schemeClr val="accent1"/>
+          </a:effectRef>
+          <a:fontRef idx="minor">
+            <a:schemeClr val="tx1"/>
+          </a:fontRef>
+        </p:style>
+      </p:cxnSp>
+      <p:sp>
+        <p:nvSpPr>
+          <p:cNvPr id="15" name="TextBox 14">
+            <a:extLst>
+              <a:ext uri="{FF2B5EF4-FFF2-40B4-BE49-F238E27FC236}">
+                <a16:creationId xmlns:a16="http://schemas.microsoft.com/office/drawing/2014/main" id="{50E541D9-B439-874C-A5A7-E76532089C44}"/>
+              </a:ext>
+            </a:extLst>
+          </p:cNvPr>
+          <p:cNvSpPr txBox="1"/>
+          <p:nvPr/>
+        </p:nvSpPr>
+        <p:spPr>
+          <a:xfrm>
+            <a:off x="3766800" y="3811495"/>
+            <a:ext cx="1355756" cy="369332"/>
+          </a:xfrm>
+          <a:prstGeom prst="rect">
+            <a:avLst/>
+          </a:prstGeom>
+          <a:noFill/>
+        </p:spPr>
+        <p:txBody>
+          <a:bodyPr wrap="none" rtlCol="0">
+            <a:spAutoFit/>
+          </a:bodyPr>
+          <a:lstStyle/>
+          <a:p>
+            <a:r>
+              <a:rPr lang="en-US" dirty="0"/>
+              <a:t>Display Start</a:t>
+            </a:r>
+          </a:p>
+        </p:txBody>
+      </p:sp>
+      <p:sp>
+        <p:nvSpPr>
+          <p:cNvPr id="19" name="TextBox 18">
+            <a:extLst>
+              <a:ext uri="{FF2B5EF4-FFF2-40B4-BE49-F238E27FC236}">
+                <a16:creationId xmlns:a16="http://schemas.microsoft.com/office/drawing/2014/main" id="{0C8F5B31-C805-7944-91FE-5A438061E29C}"/>
+              </a:ext>
+            </a:extLst>
+          </p:cNvPr>
+          <p:cNvSpPr txBox="1"/>
+          <p:nvPr/>
+        </p:nvSpPr>
+        <p:spPr>
+          <a:xfrm>
+            <a:off x="6879015" y="3826196"/>
+            <a:ext cx="1608325" cy="369332"/>
+          </a:xfrm>
+          <a:prstGeom prst="rect">
+            <a:avLst/>
+          </a:prstGeom>
+          <a:noFill/>
+        </p:spPr>
+        <p:txBody>
+          <a:bodyPr wrap="none" rtlCol="0">
+            <a:spAutoFit/>
+          </a:bodyPr>
+          <a:lstStyle/>
+          <a:p>
+            <a:r>
+              <a:rPr lang="en-US" dirty="0"/>
+              <a:t>Display Change</a:t>
+            </a:r>
+          </a:p>
+        </p:txBody>
+      </p:sp>
+      <p:sp>
+        <p:nvSpPr>
+          <p:cNvPr id="20" name="TextBox 19">
+            <a:extLst>
+              <a:ext uri="{FF2B5EF4-FFF2-40B4-BE49-F238E27FC236}">
+                <a16:creationId xmlns:a16="http://schemas.microsoft.com/office/drawing/2014/main" id="{750B2AF3-E3CE-6246-A251-B874D4CBD889}"/>
+              </a:ext>
+            </a:extLst>
+          </p:cNvPr>
+          <p:cNvSpPr txBox="1"/>
+          <p:nvPr/>
+        </p:nvSpPr>
+        <p:spPr>
+          <a:xfrm>
+            <a:off x="9206878" y="3391380"/>
+            <a:ext cx="1191168" cy="646331"/>
+          </a:xfrm>
+          <a:prstGeom prst="rect">
+            <a:avLst/>
+          </a:prstGeom>
+          <a:noFill/>
+        </p:spPr>
+        <p:txBody>
+          <a:bodyPr wrap="square" rtlCol="0">
+            <a:spAutoFit/>
+          </a:bodyPr>
+          <a:lstStyle/>
+          <a:p>
+            <a:pPr algn="ctr"/>
+            <a:r>
+              <a:rPr lang="en-US" dirty="0"/>
+              <a:t>Participant Response</a:t>
+            </a:r>
+          </a:p>
+        </p:txBody>
+      </p:sp>
+      <p:sp>
+        <p:nvSpPr>
+          <p:cNvPr id="21" name="TextBox 20">
+            <a:extLst>
+              <a:ext uri="{FF2B5EF4-FFF2-40B4-BE49-F238E27FC236}">
+                <a16:creationId xmlns:a16="http://schemas.microsoft.com/office/drawing/2014/main" id="{7679C256-E4AF-0C43-8D81-F71A8311EE1B}"/>
+              </a:ext>
+            </a:extLst>
+          </p:cNvPr>
+          <p:cNvSpPr txBox="1"/>
+          <p:nvPr/>
+        </p:nvSpPr>
+        <p:spPr>
+          <a:xfrm>
+            <a:off x="7202273" y="1310184"/>
+            <a:ext cx="335348" cy="523220"/>
+          </a:xfrm>
+          <a:prstGeom prst="rect">
+            <a:avLst/>
+          </a:prstGeom>
+          <a:noFill/>
+        </p:spPr>
+        <p:txBody>
+          <a:bodyPr wrap="none" rtlCol="0">
+            <a:spAutoFit/>
+          </a:bodyPr>
+          <a:lstStyle/>
+          <a:p>
+            <a:r>
+              <a:rPr lang="en-US" sz="2800" dirty="0"/>
+              <a:t>L</a:t>
+            </a:r>
+          </a:p>
+        </p:txBody>
+      </p:sp>
+      <p:sp>
+        <p:nvSpPr>
+          <p:cNvPr id="22" name="TextBox 21">
+            <a:extLst>
+              <a:ext uri="{FF2B5EF4-FFF2-40B4-BE49-F238E27FC236}">
+                <a16:creationId xmlns:a16="http://schemas.microsoft.com/office/drawing/2014/main" id="{027223A0-EB5D-3842-9CA3-4BB6EF9143BD}"/>
+              </a:ext>
+            </a:extLst>
+          </p:cNvPr>
+          <p:cNvSpPr txBox="1"/>
+          <p:nvPr/>
+        </p:nvSpPr>
+        <p:spPr>
+          <a:xfrm>
+            <a:off x="8180599" y="1833404"/>
+            <a:ext cx="335348" cy="523220"/>
+          </a:xfrm>
+          <a:prstGeom prst="rect">
+            <a:avLst/>
+          </a:prstGeom>
+          <a:noFill/>
+        </p:spPr>
+        <p:txBody>
+          <a:bodyPr wrap="none" rtlCol="0">
+            <a:spAutoFit/>
+          </a:bodyPr>
+          <a:lstStyle/>
+          <a:p>
+            <a:r>
+              <a:rPr lang="en-US" sz="2800" dirty="0"/>
+              <a:t>L</a:t>
+            </a:r>
+          </a:p>
+        </p:txBody>
+      </p:sp>
+      <p:sp>
+        <p:nvSpPr>
+          <p:cNvPr id="23" name="TextBox 22">
+            <a:extLst>
+              <a:ext uri="{FF2B5EF4-FFF2-40B4-BE49-F238E27FC236}">
+                <a16:creationId xmlns:a16="http://schemas.microsoft.com/office/drawing/2014/main" id="{E14D6871-4D68-C946-A2E5-567DDD050BA9}"/>
+              </a:ext>
+            </a:extLst>
+          </p:cNvPr>
+          <p:cNvSpPr txBox="1"/>
+          <p:nvPr/>
+        </p:nvSpPr>
+        <p:spPr>
+          <a:xfrm>
+            <a:off x="6866925" y="2344937"/>
+            <a:ext cx="335348" cy="523220"/>
+          </a:xfrm>
+          <a:prstGeom prst="rect">
+            <a:avLst/>
+          </a:prstGeom>
+          <a:noFill/>
+        </p:spPr>
+        <p:txBody>
+          <a:bodyPr wrap="none" rtlCol="0">
+            <a:spAutoFit/>
+          </a:bodyPr>
+          <a:lstStyle/>
+          <a:p>
+            <a:r>
+              <a:rPr lang="en-US" sz="2800" dirty="0"/>
+              <a:t>L</a:t>
+            </a:r>
+          </a:p>
+        </p:txBody>
+      </p:sp>
+      <p:sp>
+        <p:nvSpPr>
+          <p:cNvPr id="24" name="TextBox 23">
+            <a:extLst>
+              <a:ext uri="{FF2B5EF4-FFF2-40B4-BE49-F238E27FC236}">
+                <a16:creationId xmlns:a16="http://schemas.microsoft.com/office/drawing/2014/main" id="{84073D70-B03C-024F-8FFB-24F17B22FE63}"/>
+              </a:ext>
+            </a:extLst>
+          </p:cNvPr>
+          <p:cNvSpPr txBox="1"/>
+          <p:nvPr/>
+        </p:nvSpPr>
+        <p:spPr>
+          <a:xfrm>
+            <a:off x="8142559" y="897379"/>
+            <a:ext cx="335348" cy="523220"/>
+          </a:xfrm>
+          <a:prstGeom prst="rect">
+            <a:avLst/>
+          </a:prstGeom>
+          <a:noFill/>
+        </p:spPr>
+        <p:txBody>
+          <a:bodyPr wrap="none" rtlCol="0">
+            <a:spAutoFit/>
+          </a:bodyPr>
+          <a:lstStyle/>
+          <a:p>
+            <a:r>
+              <a:rPr lang="en-US" sz="2800" dirty="0"/>
+              <a:t>L</a:t>
+            </a:r>
+          </a:p>
+        </p:txBody>
+      </p:sp>
+      <p:sp>
+        <p:nvSpPr>
+          <p:cNvPr id="2" name="Oval 1">
+            <a:extLst>
+              <a:ext uri="{FF2B5EF4-FFF2-40B4-BE49-F238E27FC236}">
+                <a16:creationId xmlns:a16="http://schemas.microsoft.com/office/drawing/2014/main" id="{11F58635-3476-7442-9858-46AE46BF7378}"/>
+              </a:ext>
+            </a:extLst>
+          </p:cNvPr>
+          <p:cNvSpPr/>
+          <p:nvPr/>
+        </p:nvSpPr>
+        <p:spPr>
+          <a:xfrm>
+            <a:off x="4433215" y="2095014"/>
+            <a:ext cx="196770" cy="196770"/>
+          </a:xfrm>
+          <a:prstGeom prst="ellipse">
+            <a:avLst/>
+          </a:prstGeom>
+          <a:solidFill>
+            <a:srgbClr val="92D050"/>
+          </a:solidFill>
+          <a:ln>
+            <a:solidFill>
+              <a:schemeClr val="tx1"/>
+            </a:solidFill>
+          </a:ln>
+        </p:spPr>
+        <p:style>
+          <a:lnRef idx="2">
+            <a:schemeClr val="accent1">
+              <a:shade val="50000"/>
+            </a:schemeClr>
+          </a:lnRef>
+          <a:fillRef idx="1">
+            <a:schemeClr val="accent1"/>
+          </a:fillRef>
+          <a:effectRef idx="0">
+            <a:schemeClr val="accent1"/>
+          </a:effectRef>
+          <a:fontRef idx="minor">
+            <a:schemeClr val="lt1"/>
+          </a:fontRef>
+        </p:style>
+        <p:txBody>
+          <a:bodyPr rtlCol="0" anchor="ctr"/>
+          <a:lstStyle/>
+          <a:p>
+            <a:pPr algn="ctr"/>
+            <a:endParaRPr lang="en-US"/>
+          </a:p>
+        </p:txBody>
+      </p:sp>
+      <p:sp>
+        <p:nvSpPr>
+          <p:cNvPr id="16" name="Oval 15">
+            <a:extLst>
+              <a:ext uri="{FF2B5EF4-FFF2-40B4-BE49-F238E27FC236}">
+                <a16:creationId xmlns:a16="http://schemas.microsoft.com/office/drawing/2014/main" id="{99967489-11D6-904B-8116-0CF8302F55C1}"/>
+              </a:ext>
+            </a:extLst>
+          </p:cNvPr>
+          <p:cNvSpPr/>
+          <p:nvPr/>
+        </p:nvSpPr>
+        <p:spPr>
+          <a:xfrm>
+            <a:off x="7467078" y="1636634"/>
+            <a:ext cx="196770" cy="196770"/>
+          </a:xfrm>
+          <a:prstGeom prst="ellipse">
+            <a:avLst/>
+          </a:prstGeom>
+          <a:solidFill>
+            <a:schemeClr val="accent4">
+              <a:lumMod val="60000"/>
+              <a:lumOff val="40000"/>
+            </a:schemeClr>
+          </a:solidFill>
+          <a:ln>
+            <a:solidFill>
+              <a:schemeClr val="tx1"/>
+            </a:solidFill>
+          </a:ln>
+        </p:spPr>
+        <p:style>
+          <a:lnRef idx="2">
+            <a:schemeClr val="accent1">
+              <a:shade val="50000"/>
+            </a:schemeClr>
+          </a:lnRef>
+          <a:fillRef idx="1">
+            <a:schemeClr val="accent1"/>
+          </a:fillRef>
+          <a:effectRef idx="0">
+            <a:schemeClr val="accent1"/>
+          </a:effectRef>
+          <a:fontRef idx="minor">
+            <a:schemeClr val="lt1"/>
+          </a:fontRef>
+        </p:style>
+        <p:txBody>
+          <a:bodyPr rtlCol="0" anchor="ctr"/>
+          <a:lstStyle/>
+          <a:p>
+            <a:pPr algn="ctr"/>
+            <a:endParaRPr lang="en-US"/>
+          </a:p>
+        </p:txBody>
+      </p:sp>
+      <p:sp>
+        <p:nvSpPr>
+          <p:cNvPr id="17" name="Oval 16">
+            <a:extLst>
+              <a:ext uri="{FF2B5EF4-FFF2-40B4-BE49-F238E27FC236}">
+                <a16:creationId xmlns:a16="http://schemas.microsoft.com/office/drawing/2014/main" id="{45711AB6-5D26-4C43-8F6C-C5ACFB26A64B}"/>
+              </a:ext>
+            </a:extLst>
+          </p:cNvPr>
+          <p:cNvSpPr/>
+          <p:nvPr/>
+        </p:nvSpPr>
+        <p:spPr>
+          <a:xfrm>
+            <a:off x="7103888" y="2514007"/>
+            <a:ext cx="196770" cy="196770"/>
+          </a:xfrm>
+          <a:prstGeom prst="ellipse">
+            <a:avLst/>
+          </a:prstGeom>
+          <a:solidFill>
+            <a:schemeClr val="accent4">
+              <a:lumMod val="60000"/>
+              <a:lumOff val="40000"/>
+            </a:schemeClr>
+          </a:solidFill>
+          <a:ln>
+            <a:solidFill>
+              <a:schemeClr val="tx1"/>
+            </a:solidFill>
+          </a:ln>
+        </p:spPr>
+        <p:style>
+          <a:lnRef idx="2">
+            <a:schemeClr val="accent1">
+              <a:shade val="50000"/>
+            </a:schemeClr>
+          </a:lnRef>
+          <a:fillRef idx="1">
+            <a:schemeClr val="accent1"/>
+          </a:fillRef>
+          <a:effectRef idx="0">
+            <a:schemeClr val="accent1"/>
+          </a:effectRef>
+          <a:fontRef idx="minor">
+            <a:schemeClr val="lt1"/>
+          </a:fontRef>
+        </p:style>
+        <p:txBody>
+          <a:bodyPr rtlCol="0" anchor="ctr"/>
+          <a:lstStyle/>
+          <a:p>
+            <a:pPr algn="ctr"/>
+            <a:endParaRPr lang="en-US"/>
+          </a:p>
+        </p:txBody>
+      </p:sp>
+      <p:sp>
+        <p:nvSpPr>
+          <p:cNvPr id="18" name="Oval 17">
+            <a:extLst>
+              <a:ext uri="{FF2B5EF4-FFF2-40B4-BE49-F238E27FC236}">
+                <a16:creationId xmlns:a16="http://schemas.microsoft.com/office/drawing/2014/main" id="{EBE34DBC-7ADE-0A49-917A-73FBC690C086}"/>
+              </a:ext>
+            </a:extLst>
+          </p:cNvPr>
+          <p:cNvSpPr/>
+          <p:nvPr/>
+        </p:nvSpPr>
+        <p:spPr>
+          <a:xfrm>
+            <a:off x="8323870" y="1991561"/>
+            <a:ext cx="196770" cy="196770"/>
+          </a:xfrm>
+          <a:prstGeom prst="ellipse">
+            <a:avLst/>
+          </a:prstGeom>
+          <a:solidFill>
+            <a:srgbClr val="FF0000"/>
+          </a:solidFill>
+          <a:ln>
+            <a:solidFill>
+              <a:schemeClr val="tx1"/>
+            </a:solidFill>
+          </a:ln>
+        </p:spPr>
+        <p:style>
+          <a:lnRef idx="2">
+            <a:schemeClr val="accent1">
+              <a:shade val="50000"/>
+            </a:schemeClr>
+          </a:lnRef>
+          <a:fillRef idx="1">
+            <a:schemeClr val="accent1"/>
+          </a:fillRef>
+          <a:effectRef idx="0">
+            <a:schemeClr val="accent1"/>
+          </a:effectRef>
+          <a:fontRef idx="minor">
+            <a:schemeClr val="lt1"/>
+          </a:fontRef>
+        </p:style>
+        <p:txBody>
+          <a:bodyPr rtlCol="0" anchor="ctr"/>
+          <a:lstStyle/>
+          <a:p>
+            <a:pPr algn="ctr"/>
+            <a:endParaRPr lang="en-US"/>
+          </a:p>
+        </p:txBody>
+      </p:sp>
+      <p:cxnSp>
+        <p:nvCxnSpPr>
+          <p:cNvPr id="6" name="Straight Connector 5">
+            <a:extLst>
+              <a:ext uri="{FF2B5EF4-FFF2-40B4-BE49-F238E27FC236}">
+                <a16:creationId xmlns:a16="http://schemas.microsoft.com/office/drawing/2014/main" id="{3DD84272-1D4D-DA4C-9ED7-BDFF04AC38F6}"/>
+              </a:ext>
+            </a:extLst>
+          </p:cNvPr>
+          <p:cNvCxnSpPr>
+            <a:cxnSpLocks/>
+          </p:cNvCxnSpPr>
+          <p:nvPr/>
+        </p:nvCxnSpPr>
+        <p:spPr>
+          <a:xfrm flipH="1">
+            <a:off x="7239620" y="1823014"/>
+            <a:ext cx="293621" cy="709419"/>
+          </a:xfrm>
+          <a:prstGeom prst="line">
+            <a:avLst/>
+          </a:prstGeom>
+          <a:ln w="34925">
+            <a:solidFill>
+              <a:schemeClr val="accent2"/>
+            </a:solidFill>
+            <a:tailEnd type="triangle"/>
+          </a:ln>
+        </p:spPr>
+        <p:style>
+          <a:lnRef idx="1">
+            <a:schemeClr val="accent1"/>
+          </a:lnRef>
+          <a:fillRef idx="0">
+            <a:schemeClr val="accent1"/>
+          </a:fillRef>
+          <a:effectRef idx="0">
+            <a:schemeClr val="accent1"/>
+          </a:effectRef>
+          <a:fontRef idx="minor">
+            <a:schemeClr val="tx1"/>
+          </a:fontRef>
+        </p:style>
+      </p:cxnSp>
+      <p:cxnSp>
+        <p:nvCxnSpPr>
+          <p:cNvPr id="25" name="Straight Connector 24">
+            <a:extLst>
+              <a:ext uri="{FF2B5EF4-FFF2-40B4-BE49-F238E27FC236}">
+                <a16:creationId xmlns:a16="http://schemas.microsoft.com/office/drawing/2014/main" id="{48979D51-BC7C-EA41-A33F-A7AC7D0A0CB2}"/>
+              </a:ext>
+            </a:extLst>
+          </p:cNvPr>
+          <p:cNvCxnSpPr>
+            <a:cxnSpLocks/>
+            <a:endCxn id="18" idx="3"/>
+          </p:cNvCxnSpPr>
+          <p:nvPr/>
+        </p:nvCxnSpPr>
+        <p:spPr>
+          <a:xfrm flipV="1">
+            <a:off x="7300658" y="2159515"/>
+            <a:ext cx="1052028" cy="452877"/>
+          </a:xfrm>
+          <a:prstGeom prst="line">
+            <a:avLst/>
+          </a:prstGeom>
+          <a:ln w="34925">
+            <a:solidFill>
+              <a:schemeClr val="accent2"/>
+            </a:solidFill>
+            <a:tailEnd type="triangle"/>
+          </a:ln>
+        </p:spPr>
+        <p:style>
+          <a:lnRef idx="1">
+            <a:schemeClr val="accent1"/>
+          </a:lnRef>
+          <a:fillRef idx="0">
+            <a:schemeClr val="accent1"/>
+          </a:fillRef>
+          <a:effectRef idx="0">
+            <a:schemeClr val="accent1"/>
+          </a:effectRef>
+          <a:fontRef idx="minor">
+            <a:schemeClr val="tx1"/>
+          </a:fontRef>
+        </p:style>
+      </p:cxnSp>
+      <p:sp>
+        <p:nvSpPr>
+          <p:cNvPr id="27" name="Oval 26">
+            <a:extLst>
+              <a:ext uri="{FF2B5EF4-FFF2-40B4-BE49-F238E27FC236}">
+                <a16:creationId xmlns:a16="http://schemas.microsoft.com/office/drawing/2014/main" id="{48C5ADC4-AB59-DE45-95E1-58DAD6A5E1E7}"/>
+              </a:ext>
+            </a:extLst>
+          </p:cNvPr>
+          <p:cNvSpPr/>
+          <p:nvPr/>
+        </p:nvSpPr>
+        <p:spPr>
+          <a:xfrm>
+            <a:off x="7629583" y="2089946"/>
+            <a:ext cx="196770" cy="196770"/>
+          </a:xfrm>
+          <a:prstGeom prst="ellipse">
+            <a:avLst/>
+          </a:prstGeom>
+          <a:solidFill>
+            <a:srgbClr val="92D050"/>
+          </a:solidFill>
+          <a:ln>
+            <a:solidFill>
+              <a:schemeClr val="tx1"/>
+            </a:solidFill>
+          </a:ln>
+        </p:spPr>
+        <p:style>
+          <a:lnRef idx="2">
+            <a:schemeClr val="accent1">
+              <a:shade val="50000"/>
+            </a:schemeClr>
+          </a:lnRef>
+          <a:fillRef idx="1">
+            <a:schemeClr val="accent1"/>
+          </a:fillRef>
+          <a:effectRef idx="0">
+            <a:schemeClr val="accent1"/>
+          </a:effectRef>
+          <a:fontRef idx="minor">
+            <a:schemeClr val="lt1"/>
+          </a:fontRef>
+        </p:style>
+        <p:txBody>
+          <a:bodyPr rtlCol="0" anchor="ctr"/>
+          <a:lstStyle/>
+          <a:p>
+            <a:pPr algn="ctr"/>
+            <a:endParaRPr lang="en-US"/>
+          </a:p>
+        </p:txBody>
+      </p:sp>
+      <p:cxnSp>
+        <p:nvCxnSpPr>
+          <p:cNvPr id="28" name="Straight Connector 27">
+            <a:extLst>
+              <a:ext uri="{FF2B5EF4-FFF2-40B4-BE49-F238E27FC236}">
+                <a16:creationId xmlns:a16="http://schemas.microsoft.com/office/drawing/2014/main" id="{192FA822-738F-C140-9FD7-DD02C9A7EE3A}"/>
+              </a:ext>
+            </a:extLst>
+          </p:cNvPr>
+          <p:cNvCxnSpPr>
+            <a:cxnSpLocks/>
+            <a:stCxn id="27" idx="0"/>
+          </p:cNvCxnSpPr>
+          <p:nvPr/>
+        </p:nvCxnSpPr>
+        <p:spPr>
+          <a:xfrm flipH="1" flipV="1">
+            <a:off x="7624890" y="1833404"/>
+            <a:ext cx="103078" cy="256542"/>
+          </a:xfrm>
+          <a:prstGeom prst="line">
+            <a:avLst/>
+          </a:prstGeom>
+          <a:ln w="34925">
+            <a:solidFill>
+              <a:schemeClr val="accent2"/>
+            </a:solidFill>
+            <a:tailEnd type="triangle"/>
+          </a:ln>
+        </p:spPr>
+        <p:style>
+          <a:lnRef idx="1">
+            <a:schemeClr val="accent1"/>
+          </a:lnRef>
+          <a:fillRef idx="0">
+            <a:schemeClr val="accent1"/>
+          </a:fillRef>
+          <a:effectRef idx="0">
+            <a:schemeClr val="accent1"/>
+          </a:effectRef>
+          <a:fontRef idx="minor">
+            <a:schemeClr val="tx1"/>
+          </a:fontRef>
+        </p:style>
+      </p:cxnSp>
+      <p:sp>
+        <p:nvSpPr>
+          <p:cNvPr id="3" name="Rectangle 2">
+            <a:extLst>
+              <a:ext uri="{FF2B5EF4-FFF2-40B4-BE49-F238E27FC236}">
+                <a16:creationId xmlns:a16="http://schemas.microsoft.com/office/drawing/2014/main" id="{B3DA311E-815C-AF4D-B5FB-D67CCB9C62B2}"/>
+              </a:ext>
+            </a:extLst>
+          </p:cNvPr>
+          <p:cNvSpPr/>
+          <p:nvPr/>
+        </p:nvSpPr>
+        <p:spPr>
+          <a:xfrm>
+            <a:off x="3020992" y="4294208"/>
+            <a:ext cx="3981692" cy="335665"/>
+          </a:xfrm>
+          <a:prstGeom prst="rect">
+            <a:avLst/>
+          </a:prstGeom>
+          <a:solidFill>
+            <a:schemeClr val="accent6">
+              <a:lumMod val="60000"/>
+              <a:lumOff val="40000"/>
+            </a:schemeClr>
+          </a:solidFill>
+          <a:ln w="25400">
+            <a:solidFill>
+              <a:schemeClr val="tx1"/>
+            </a:solidFill>
+          </a:ln>
+        </p:spPr>
+        <p:style>
+          <a:lnRef idx="2">
+            <a:schemeClr val="accent1">
+              <a:shade val="50000"/>
+            </a:schemeClr>
+          </a:lnRef>
+          <a:fillRef idx="1">
+            <a:schemeClr val="accent1"/>
+          </a:fillRef>
+          <a:effectRef idx="0">
+            <a:schemeClr val="accent1"/>
+          </a:effectRef>
+          <a:fontRef idx="minor">
+            <a:schemeClr val="lt1"/>
+          </a:fontRef>
+        </p:style>
+        <p:txBody>
+          <a:bodyPr rtlCol="0" anchor="ctr"/>
+          <a:lstStyle/>
+          <a:p>
+            <a:pPr algn="ctr"/>
+            <a:endParaRPr lang="en-US"/>
+          </a:p>
+        </p:txBody>
+      </p:sp>
+      <p:sp>
+        <p:nvSpPr>
+          <p:cNvPr id="26" name="Rectangle 25">
+            <a:extLst>
+              <a:ext uri="{FF2B5EF4-FFF2-40B4-BE49-F238E27FC236}">
+                <a16:creationId xmlns:a16="http://schemas.microsoft.com/office/drawing/2014/main" id="{D3709E98-6C66-EB4A-A6DF-AB55CD9433CB}"/>
+              </a:ext>
+            </a:extLst>
+          </p:cNvPr>
+          <p:cNvSpPr/>
+          <p:nvPr/>
+        </p:nvSpPr>
+        <p:spPr>
+          <a:xfrm>
+            <a:off x="7103888" y="4294208"/>
+            <a:ext cx="722465" cy="335664"/>
+          </a:xfrm>
+          <a:prstGeom prst="rect">
+            <a:avLst/>
+          </a:prstGeom>
+          <a:solidFill>
+            <a:schemeClr val="accent4">
+              <a:lumMod val="60000"/>
+              <a:lumOff val="40000"/>
+            </a:schemeClr>
+          </a:solidFill>
+          <a:ln w="25400">
+            <a:solidFill>
+              <a:schemeClr val="tx1"/>
+            </a:solidFill>
+          </a:ln>
+        </p:spPr>
+        <p:style>
+          <a:lnRef idx="2">
+            <a:schemeClr val="accent1">
+              <a:shade val="50000"/>
+            </a:schemeClr>
+          </a:lnRef>
+          <a:fillRef idx="1">
+            <a:schemeClr val="accent1"/>
+          </a:fillRef>
+          <a:effectRef idx="0">
+            <a:schemeClr val="accent1"/>
+          </a:effectRef>
+          <a:fontRef idx="minor">
+            <a:schemeClr val="lt1"/>
+          </a:fontRef>
+        </p:style>
+        <p:txBody>
+          <a:bodyPr rtlCol="0" anchor="ctr"/>
+          <a:lstStyle/>
+          <a:p>
+            <a:pPr algn="ctr"/>
+            <a:endParaRPr lang="en-US"/>
+          </a:p>
+        </p:txBody>
+      </p:sp>
+      <p:sp>
+        <p:nvSpPr>
+          <p:cNvPr id="29" name="Rectangle 28">
+            <a:extLst>
+              <a:ext uri="{FF2B5EF4-FFF2-40B4-BE49-F238E27FC236}">
+                <a16:creationId xmlns:a16="http://schemas.microsoft.com/office/drawing/2014/main" id="{3AC8B731-725E-3B46-848C-ADD13B8BC084}"/>
+              </a:ext>
+            </a:extLst>
+          </p:cNvPr>
+          <p:cNvSpPr/>
+          <p:nvPr/>
+        </p:nvSpPr>
+        <p:spPr>
+          <a:xfrm>
+            <a:off x="7949000" y="4305503"/>
+            <a:ext cx="722465" cy="335664"/>
+          </a:xfrm>
+          <a:prstGeom prst="rect">
+            <a:avLst/>
+          </a:prstGeom>
+          <a:solidFill>
+            <a:schemeClr val="accent4">
+              <a:lumMod val="60000"/>
+              <a:lumOff val="40000"/>
+            </a:schemeClr>
+          </a:solidFill>
+          <a:ln w="25400">
+            <a:solidFill>
+              <a:schemeClr val="tx1"/>
+            </a:solidFill>
+          </a:ln>
+        </p:spPr>
+        <p:style>
+          <a:lnRef idx="2">
+            <a:schemeClr val="accent1">
+              <a:shade val="50000"/>
+            </a:schemeClr>
+          </a:lnRef>
+          <a:fillRef idx="1">
+            <a:schemeClr val="accent1"/>
+          </a:fillRef>
+          <a:effectRef idx="0">
+            <a:schemeClr val="accent1"/>
+          </a:effectRef>
+          <a:fontRef idx="minor">
+            <a:schemeClr val="lt1"/>
+          </a:fontRef>
+        </p:style>
+        <p:txBody>
+          <a:bodyPr rtlCol="0" anchor="ctr"/>
+          <a:lstStyle/>
+          <a:p>
+            <a:pPr algn="ctr"/>
+            <a:endParaRPr lang="en-US"/>
+          </a:p>
+        </p:txBody>
+      </p:sp>
+      <p:sp>
+        <p:nvSpPr>
+          <p:cNvPr id="30" name="Rectangle 29">
+            <a:extLst>
+              <a:ext uri="{FF2B5EF4-FFF2-40B4-BE49-F238E27FC236}">
+                <a16:creationId xmlns:a16="http://schemas.microsoft.com/office/drawing/2014/main" id="{2AD253BB-7057-A247-AEA0-2039A8B2D612}"/>
+              </a:ext>
+            </a:extLst>
+          </p:cNvPr>
+          <p:cNvSpPr/>
+          <p:nvPr/>
+        </p:nvSpPr>
+        <p:spPr>
+          <a:xfrm>
+            <a:off x="8794112" y="4305503"/>
+            <a:ext cx="1603934" cy="335664"/>
+          </a:xfrm>
+          <a:prstGeom prst="rect">
+            <a:avLst/>
+          </a:prstGeom>
+          <a:solidFill>
+            <a:srgbClr val="FF0000"/>
+          </a:solidFill>
+          <a:ln w="25400">
+            <a:solidFill>
+              <a:schemeClr val="tx1"/>
+            </a:solidFill>
+          </a:ln>
+        </p:spPr>
+        <p:style>
+          <a:lnRef idx="2">
+            <a:schemeClr val="accent1">
+              <a:shade val="50000"/>
+            </a:schemeClr>
+          </a:lnRef>
+          <a:fillRef idx="1">
+            <a:schemeClr val="accent1"/>
+          </a:fillRef>
+          <a:effectRef idx="0">
+            <a:schemeClr val="accent1"/>
+          </a:effectRef>
+          <a:fontRef idx="minor">
+            <a:schemeClr val="lt1"/>
+          </a:fontRef>
+        </p:style>
+        <p:txBody>
+          <a:bodyPr rtlCol="0" anchor="ctr"/>
+          <a:lstStyle/>
+          <a:p>
+            <a:pPr algn="ctr"/>
+            <a:endParaRPr lang="en-US"/>
+          </a:p>
+        </p:txBody>
+      </p:sp>
+      <p:sp>
+        <p:nvSpPr>
+          <p:cNvPr id="7" name="TextBox 6">
+            <a:extLst>
+              <a:ext uri="{FF2B5EF4-FFF2-40B4-BE49-F238E27FC236}">
+                <a16:creationId xmlns:a16="http://schemas.microsoft.com/office/drawing/2014/main" id="{1318531E-2FDD-A54B-AA69-559CD0936E21}"/>
+              </a:ext>
+            </a:extLst>
+          </p:cNvPr>
+          <p:cNvSpPr txBox="1"/>
+          <p:nvPr/>
+        </p:nvSpPr>
+        <p:spPr>
+          <a:xfrm>
+            <a:off x="3356833" y="4781263"/>
+            <a:ext cx="3310009" cy="369332"/>
+          </a:xfrm>
+          <a:prstGeom prst="rect">
+            <a:avLst/>
+          </a:prstGeom>
+          <a:noFill/>
+        </p:spPr>
+        <p:txBody>
+          <a:bodyPr wrap="none" rtlCol="0">
+            <a:spAutoFit/>
+          </a:bodyPr>
+          <a:lstStyle/>
+          <a:p>
+            <a:r>
+              <a:rPr lang="en-US" dirty="0"/>
+              <a:t>Display Start AND Display Change</a:t>
+            </a:r>
+          </a:p>
+        </p:txBody>
+      </p:sp>
+      <p:sp>
+        <p:nvSpPr>
+          <p:cNvPr id="31" name="TextBox 30">
+            <a:extLst>
+              <a:ext uri="{FF2B5EF4-FFF2-40B4-BE49-F238E27FC236}">
+                <a16:creationId xmlns:a16="http://schemas.microsoft.com/office/drawing/2014/main" id="{2655925E-BD8C-264D-8DAD-44D509AA99BE}"/>
+              </a:ext>
+            </a:extLst>
+          </p:cNvPr>
+          <p:cNvSpPr txBox="1"/>
+          <p:nvPr/>
+        </p:nvSpPr>
+        <p:spPr>
+          <a:xfrm>
+            <a:off x="7002684" y="4807259"/>
+            <a:ext cx="1668781" cy="646331"/>
+          </a:xfrm>
+          <a:prstGeom prst="rect">
+            <a:avLst/>
+          </a:prstGeom>
+          <a:noFill/>
+        </p:spPr>
+        <p:txBody>
+          <a:bodyPr wrap="square" rtlCol="0">
+            <a:spAutoFit/>
+          </a:bodyPr>
+          <a:lstStyle/>
+          <a:p>
+            <a:pPr algn="ctr"/>
+            <a:r>
+              <a:rPr lang="en-US" dirty="0"/>
+              <a:t>Display Change only</a:t>
+            </a:r>
+          </a:p>
+        </p:txBody>
+      </p:sp>
+      <p:sp>
+        <p:nvSpPr>
+          <p:cNvPr id="32" name="TextBox 31">
+            <a:extLst>
+              <a:ext uri="{FF2B5EF4-FFF2-40B4-BE49-F238E27FC236}">
+                <a16:creationId xmlns:a16="http://schemas.microsoft.com/office/drawing/2014/main" id="{4C4C29F5-D8AA-9242-942C-8EF18400DEE0}"/>
+              </a:ext>
+            </a:extLst>
+          </p:cNvPr>
+          <p:cNvSpPr txBox="1"/>
+          <p:nvPr/>
+        </p:nvSpPr>
+        <p:spPr>
+          <a:xfrm>
+            <a:off x="8671465" y="4807258"/>
+            <a:ext cx="1668781" cy="923330"/>
+          </a:xfrm>
+          <a:prstGeom prst="rect">
+            <a:avLst/>
+          </a:prstGeom>
+          <a:noFill/>
+        </p:spPr>
+        <p:txBody>
+          <a:bodyPr wrap="square" rtlCol="0">
+            <a:spAutoFit/>
+          </a:bodyPr>
+          <a:lstStyle/>
+          <a:p>
+            <a:pPr algn="ctr"/>
+            <a:r>
+              <a:rPr lang="en-US" dirty="0"/>
+              <a:t>Display Change and Participant Response</a:t>
+            </a:r>
+          </a:p>
+        </p:txBody>
+      </p:sp>
+    </p:spTree>
+    <p:extLst>
+      <p:ext uri="{BB962C8B-B14F-4D97-AF65-F5344CB8AC3E}">
+        <p14:creationId xmlns:p14="http://schemas.microsoft.com/office/powerpoint/2010/main" val="3764414500"/>
+      </p:ext>
+    </p:extLst>
+  </p:cSld>
+  <p:clrMapOvr>
+    <a:masterClrMapping/>
+  </p:clrMapOvr>
+</p:sld>
+</file>
+
+<file path=ppt/slides/slide4.xml><?xml version="1.0" encoding="utf-8"?>
 <p:sld xmlns:a="http://schemas.openxmlformats.org/drawingml/2006/main" xmlns:r="http://schemas.openxmlformats.org/officeDocument/2006/relationships" xmlns:p="http://schemas.openxmlformats.org/presentationml/2006/main">
   <p:cSld>
     <p:spTree>

</xml_diff>

<commit_message>
Fixing typos and added a figure that had been missed.
</commit_message>
<xml_diff>
--- a/bookdown source/files/ppt/Examples for Bookdown.pptx
+++ b/bookdown source/files/ppt/Examples for Bookdown.pptx
@@ -9,6 +9,7 @@
     <p:sldId id="257" r:id="rId3"/>
     <p:sldId id="259" r:id="rId4"/>
     <p:sldId id="258" r:id="rId5"/>
+    <p:sldId id="260" r:id="rId6"/>
   </p:sldIdLst>
   <p:sldSz cx="12192000" cy="6858000"/>
   <p:notesSz cx="6858000" cy="9144000"/>
@@ -262,7 +263,7 @@
           <a:p>
             <a:fld id="{63889709-0435-BE4C-897A-4998963CC9D4}" type="datetimeFigureOut">
               <a:rPr lang="en-US" smtClean="0"/>
-              <a:t>10/29/19</a:t>
+              <a:t>11/1/19</a:t>
             </a:fld>
             <a:endParaRPr lang="en-US"/>
           </a:p>
@@ -460,7 +461,7 @@
           <a:p>
             <a:fld id="{63889709-0435-BE4C-897A-4998963CC9D4}" type="datetimeFigureOut">
               <a:rPr lang="en-US" smtClean="0"/>
-              <a:t>10/29/19</a:t>
+              <a:t>11/1/19</a:t>
             </a:fld>
             <a:endParaRPr lang="en-US"/>
           </a:p>
@@ -668,7 +669,7 @@
           <a:p>
             <a:fld id="{63889709-0435-BE4C-897A-4998963CC9D4}" type="datetimeFigureOut">
               <a:rPr lang="en-US" smtClean="0"/>
-              <a:t>10/29/19</a:t>
+              <a:t>11/1/19</a:t>
             </a:fld>
             <a:endParaRPr lang="en-US"/>
           </a:p>
@@ -866,7 +867,7 @@
           <a:p>
             <a:fld id="{63889709-0435-BE4C-897A-4998963CC9D4}" type="datetimeFigureOut">
               <a:rPr lang="en-US" smtClean="0"/>
-              <a:t>10/29/19</a:t>
+              <a:t>11/1/19</a:t>
             </a:fld>
             <a:endParaRPr lang="en-US"/>
           </a:p>
@@ -1141,7 +1142,7 @@
           <a:p>
             <a:fld id="{63889709-0435-BE4C-897A-4998963CC9D4}" type="datetimeFigureOut">
               <a:rPr lang="en-US" smtClean="0"/>
-              <a:t>10/29/19</a:t>
+              <a:t>11/1/19</a:t>
             </a:fld>
             <a:endParaRPr lang="en-US"/>
           </a:p>
@@ -1406,7 +1407,7 @@
           <a:p>
             <a:fld id="{63889709-0435-BE4C-897A-4998963CC9D4}" type="datetimeFigureOut">
               <a:rPr lang="en-US" smtClean="0"/>
-              <a:t>10/29/19</a:t>
+              <a:t>11/1/19</a:t>
             </a:fld>
             <a:endParaRPr lang="en-US"/>
           </a:p>
@@ -1818,7 +1819,7 @@
           <a:p>
             <a:fld id="{63889709-0435-BE4C-897A-4998963CC9D4}" type="datetimeFigureOut">
               <a:rPr lang="en-US" smtClean="0"/>
-              <a:t>10/29/19</a:t>
+              <a:t>11/1/19</a:t>
             </a:fld>
             <a:endParaRPr lang="en-US"/>
           </a:p>
@@ -1959,7 +1960,7 @@
           <a:p>
             <a:fld id="{63889709-0435-BE4C-897A-4998963CC9D4}" type="datetimeFigureOut">
               <a:rPr lang="en-US" smtClean="0"/>
-              <a:t>10/29/19</a:t>
+              <a:t>11/1/19</a:t>
             </a:fld>
             <a:endParaRPr lang="en-US"/>
           </a:p>
@@ -2072,7 +2073,7 @@
           <a:p>
             <a:fld id="{63889709-0435-BE4C-897A-4998963CC9D4}" type="datetimeFigureOut">
               <a:rPr lang="en-US" smtClean="0"/>
-              <a:t>10/29/19</a:t>
+              <a:t>11/1/19</a:t>
             </a:fld>
             <a:endParaRPr lang="en-US"/>
           </a:p>
@@ -2383,7 +2384,7 @@
           <a:p>
             <a:fld id="{63889709-0435-BE4C-897A-4998963CC9D4}" type="datetimeFigureOut">
               <a:rPr lang="en-US" smtClean="0"/>
-              <a:t>10/29/19</a:t>
+              <a:t>11/1/19</a:t>
             </a:fld>
             <a:endParaRPr lang="en-US"/>
           </a:p>
@@ -2671,7 +2672,7 @@
           <a:p>
             <a:fld id="{63889709-0435-BE4C-897A-4998963CC9D4}" type="datetimeFigureOut">
               <a:rPr lang="en-US" smtClean="0"/>
-              <a:t>10/29/19</a:t>
+              <a:t>11/1/19</a:t>
             </a:fld>
             <a:endParaRPr lang="en-US"/>
           </a:p>
@@ -2912,7 +2913,7 @@
           <a:p>
             <a:fld id="{63889709-0435-BE4C-897A-4998963CC9D4}" type="datetimeFigureOut">
               <a:rPr lang="en-US" smtClean="0"/>
-              <a:t>10/29/19</a:t>
+              <a:t>11/1/19</a:t>
             </a:fld>
             <a:endParaRPr lang="en-US"/>
           </a:p>
@@ -6874,6 +6875,872 @@
 </p:sld>
 </file>
 
+<file path=ppt/slides/slide5.xml><?xml version="1.0" encoding="utf-8"?>
+<p:sld xmlns:a="http://schemas.openxmlformats.org/drawingml/2006/main" xmlns:r="http://schemas.openxmlformats.org/officeDocument/2006/relationships" xmlns:p="http://schemas.openxmlformats.org/presentationml/2006/main">
+  <p:cSld>
+    <p:spTree>
+      <p:nvGrpSpPr>
+        <p:cNvPr id="1" name=""/>
+        <p:cNvGrpSpPr/>
+        <p:nvPr/>
+      </p:nvGrpSpPr>
+      <p:grpSpPr>
+        <a:xfrm>
+          <a:off x="0" y="0"/>
+          <a:ext cx="0" cy="0"/>
+          <a:chOff x="0" y="0"/>
+          <a:chExt cx="0" cy="0"/>
+        </a:xfrm>
+      </p:grpSpPr>
+      <p:sp>
+        <p:nvSpPr>
+          <p:cNvPr id="4" name="Rounded Rectangle 3">
+            <a:extLst>
+              <a:ext uri="{FF2B5EF4-FFF2-40B4-BE49-F238E27FC236}">
+                <a16:creationId xmlns:a16="http://schemas.microsoft.com/office/drawing/2014/main" id="{397B3896-358B-E347-8BDE-B5C6208FEE2F}"/>
+              </a:ext>
+            </a:extLst>
+          </p:cNvPr>
+          <p:cNvSpPr/>
+          <p:nvPr/>
+        </p:nvSpPr>
+        <p:spPr>
+          <a:xfrm>
+            <a:off x="760866" y="1678600"/>
+            <a:ext cx="1880999" cy="1712780"/>
+          </a:xfrm>
+          <a:prstGeom prst="roundRect">
+            <a:avLst/>
+          </a:prstGeom>
+          <a:solidFill>
+            <a:schemeClr val="bg1"/>
+          </a:solidFill>
+          <a:ln w="25400">
+            <a:solidFill>
+              <a:schemeClr val="tx1"/>
+            </a:solidFill>
+          </a:ln>
+          <a:effectLst>
+            <a:outerShdw blurRad="50800" dist="38100" dir="2700000" algn="tl" rotWithShape="0">
+              <a:prstClr val="black">
+                <a:alpha val="40000"/>
+              </a:prstClr>
+            </a:outerShdw>
+          </a:effectLst>
+        </p:spPr>
+        <p:style>
+          <a:lnRef idx="2">
+            <a:schemeClr val="accent1">
+              <a:shade val="50000"/>
+            </a:schemeClr>
+          </a:lnRef>
+          <a:fillRef idx="1">
+            <a:schemeClr val="accent1"/>
+          </a:fillRef>
+          <a:effectRef idx="0">
+            <a:schemeClr val="accent1"/>
+          </a:effectRef>
+          <a:fontRef idx="minor">
+            <a:schemeClr val="lt1"/>
+          </a:fontRef>
+        </p:style>
+        <p:txBody>
+          <a:bodyPr rtlCol="0" anchor="ctr"/>
+          <a:lstStyle/>
+          <a:p>
+            <a:pPr algn="ctr"/>
+            <a:endParaRPr lang="en-US"/>
+          </a:p>
+        </p:txBody>
+      </p:sp>
+      <p:sp>
+        <p:nvSpPr>
+          <p:cNvPr id="5" name="Rounded Rectangle 4">
+            <a:extLst>
+              <a:ext uri="{FF2B5EF4-FFF2-40B4-BE49-F238E27FC236}">
+                <a16:creationId xmlns:a16="http://schemas.microsoft.com/office/drawing/2014/main" id="{376C7AA9-F7B5-DF4E-A2F2-F42E758583B5}"/>
+              </a:ext>
+            </a:extLst>
+          </p:cNvPr>
+          <p:cNvSpPr/>
+          <p:nvPr/>
+        </p:nvSpPr>
+        <p:spPr>
+          <a:xfrm>
+            <a:off x="7225864" y="1678600"/>
+            <a:ext cx="1880999" cy="1712780"/>
+          </a:xfrm>
+          <a:prstGeom prst="roundRect">
+            <a:avLst/>
+          </a:prstGeom>
+          <a:solidFill>
+            <a:schemeClr val="bg1"/>
+          </a:solidFill>
+          <a:ln w="25400">
+            <a:solidFill>
+              <a:schemeClr val="tx1"/>
+            </a:solidFill>
+          </a:ln>
+          <a:effectLst>
+            <a:outerShdw blurRad="50800" dist="38100" dir="2700000" algn="tl" rotWithShape="0">
+              <a:prstClr val="black">
+                <a:alpha val="40000"/>
+              </a:prstClr>
+            </a:outerShdw>
+          </a:effectLst>
+        </p:spPr>
+        <p:style>
+          <a:lnRef idx="2">
+            <a:schemeClr val="accent1">
+              <a:shade val="50000"/>
+            </a:schemeClr>
+          </a:lnRef>
+          <a:fillRef idx="1">
+            <a:schemeClr val="accent1"/>
+          </a:fillRef>
+          <a:effectRef idx="0">
+            <a:schemeClr val="accent1"/>
+          </a:effectRef>
+          <a:fontRef idx="minor">
+            <a:schemeClr val="lt1"/>
+          </a:fontRef>
+        </p:style>
+        <p:txBody>
+          <a:bodyPr rtlCol="0" anchor="ctr"/>
+          <a:lstStyle/>
+          <a:p>
+            <a:pPr algn="ctr"/>
+            <a:endParaRPr lang="en-US"/>
+          </a:p>
+        </p:txBody>
+      </p:sp>
+      <p:sp>
+        <p:nvSpPr>
+          <p:cNvPr id="8" name="TextBox 7">
+            <a:extLst>
+              <a:ext uri="{FF2B5EF4-FFF2-40B4-BE49-F238E27FC236}">
+                <a16:creationId xmlns:a16="http://schemas.microsoft.com/office/drawing/2014/main" id="{C7137D25-25A9-654E-A6EA-35DBAAFC9423}"/>
+              </a:ext>
+            </a:extLst>
+          </p:cNvPr>
+          <p:cNvSpPr txBox="1"/>
+          <p:nvPr/>
+        </p:nvSpPr>
+        <p:spPr>
+          <a:xfrm>
+            <a:off x="1516058" y="2172355"/>
+            <a:ext cx="370614" cy="523220"/>
+          </a:xfrm>
+          <a:prstGeom prst="rect">
+            <a:avLst/>
+          </a:prstGeom>
+          <a:noFill/>
+        </p:spPr>
+        <p:txBody>
+          <a:bodyPr wrap="none" rtlCol="0">
+            <a:spAutoFit/>
+          </a:bodyPr>
+          <a:lstStyle/>
+          <a:p>
+            <a:r>
+              <a:rPr lang="en-US" sz="2800" dirty="0"/>
+              <a:t>X</a:t>
+            </a:r>
+          </a:p>
+        </p:txBody>
+      </p:sp>
+      <p:cxnSp>
+        <p:nvCxnSpPr>
+          <p:cNvPr id="14" name="Straight Arrow Connector 13">
+            <a:extLst>
+              <a:ext uri="{FF2B5EF4-FFF2-40B4-BE49-F238E27FC236}">
+                <a16:creationId xmlns:a16="http://schemas.microsoft.com/office/drawing/2014/main" id="{A4E22BF7-1C79-8A40-95F0-F78833575F53}"/>
+              </a:ext>
+            </a:extLst>
+          </p:cNvPr>
+          <p:cNvCxnSpPr>
+            <a:cxnSpLocks/>
+          </p:cNvCxnSpPr>
+          <p:nvPr/>
+        </p:nvCxnSpPr>
+        <p:spPr>
+          <a:xfrm>
+            <a:off x="601884" y="3693771"/>
+            <a:ext cx="8504980" cy="0"/>
+          </a:xfrm>
+          <a:prstGeom prst="straightConnector1">
+            <a:avLst/>
+          </a:prstGeom>
+          <a:ln w="60325">
+            <a:solidFill>
+              <a:schemeClr val="tx1"/>
+            </a:solidFill>
+            <a:tailEnd type="triangle"/>
+          </a:ln>
+          <a:effectLst>
+            <a:outerShdw blurRad="50800" dist="38100" dir="2700000" algn="tl" rotWithShape="0">
+              <a:prstClr val="black">
+                <a:alpha val="40000"/>
+              </a:prstClr>
+            </a:outerShdw>
+          </a:effectLst>
+        </p:spPr>
+        <p:style>
+          <a:lnRef idx="1">
+            <a:schemeClr val="accent1"/>
+          </a:lnRef>
+          <a:fillRef idx="0">
+            <a:schemeClr val="accent1"/>
+          </a:fillRef>
+          <a:effectRef idx="0">
+            <a:schemeClr val="accent1"/>
+          </a:effectRef>
+          <a:fontRef idx="minor">
+            <a:schemeClr val="tx1"/>
+          </a:fontRef>
+        </p:style>
+      </p:cxnSp>
+      <p:sp>
+        <p:nvSpPr>
+          <p:cNvPr id="15" name="TextBox 14">
+            <a:extLst>
+              <a:ext uri="{FF2B5EF4-FFF2-40B4-BE49-F238E27FC236}">
+                <a16:creationId xmlns:a16="http://schemas.microsoft.com/office/drawing/2014/main" id="{50E541D9-B439-874C-A5A7-E76532089C44}"/>
+              </a:ext>
+            </a:extLst>
+          </p:cNvPr>
+          <p:cNvSpPr txBox="1"/>
+          <p:nvPr/>
+        </p:nvSpPr>
+        <p:spPr>
+          <a:xfrm>
+            <a:off x="1023487" y="3853045"/>
+            <a:ext cx="1355756" cy="369332"/>
+          </a:xfrm>
+          <a:prstGeom prst="rect">
+            <a:avLst/>
+          </a:prstGeom>
+          <a:noFill/>
+        </p:spPr>
+        <p:txBody>
+          <a:bodyPr wrap="none" rtlCol="0">
+            <a:spAutoFit/>
+          </a:bodyPr>
+          <a:lstStyle/>
+          <a:p>
+            <a:r>
+              <a:rPr lang="en-US" dirty="0"/>
+              <a:t>Display Start</a:t>
+            </a:r>
+          </a:p>
+        </p:txBody>
+      </p:sp>
+      <p:sp>
+        <p:nvSpPr>
+          <p:cNvPr id="19" name="TextBox 18">
+            <a:extLst>
+              <a:ext uri="{FF2B5EF4-FFF2-40B4-BE49-F238E27FC236}">
+                <a16:creationId xmlns:a16="http://schemas.microsoft.com/office/drawing/2014/main" id="{0C8F5B31-C805-7944-91FE-5A438061E29C}"/>
+              </a:ext>
+            </a:extLst>
+          </p:cNvPr>
+          <p:cNvSpPr txBox="1"/>
+          <p:nvPr/>
+        </p:nvSpPr>
+        <p:spPr>
+          <a:xfrm>
+            <a:off x="7347876" y="3811497"/>
+            <a:ext cx="1633845" cy="369332"/>
+          </a:xfrm>
+          <a:prstGeom prst="rect">
+            <a:avLst/>
+          </a:prstGeom>
+          <a:noFill/>
+        </p:spPr>
+        <p:txBody>
+          <a:bodyPr wrap="none" rtlCol="0">
+            <a:spAutoFit/>
+          </a:bodyPr>
+          <a:lstStyle/>
+          <a:p>
+            <a:r>
+              <a:rPr lang="en-US" dirty="0"/>
+              <a:t>Display Returns</a:t>
+            </a:r>
+          </a:p>
+        </p:txBody>
+      </p:sp>
+      <p:sp>
+        <p:nvSpPr>
+          <p:cNvPr id="20" name="TextBox 19">
+            <a:extLst>
+              <a:ext uri="{FF2B5EF4-FFF2-40B4-BE49-F238E27FC236}">
+                <a16:creationId xmlns:a16="http://schemas.microsoft.com/office/drawing/2014/main" id="{750B2AF3-E3CE-6246-A251-B874D4CBD889}"/>
+              </a:ext>
+            </a:extLst>
+          </p:cNvPr>
+          <p:cNvSpPr txBox="1"/>
+          <p:nvPr/>
+        </p:nvSpPr>
+        <p:spPr>
+          <a:xfrm>
+            <a:off x="9206878" y="3391380"/>
+            <a:ext cx="1191168" cy="646331"/>
+          </a:xfrm>
+          <a:prstGeom prst="rect">
+            <a:avLst/>
+          </a:prstGeom>
+          <a:noFill/>
+        </p:spPr>
+        <p:txBody>
+          <a:bodyPr wrap="square" rtlCol="0">
+            <a:spAutoFit/>
+          </a:bodyPr>
+          <a:lstStyle/>
+          <a:p>
+            <a:pPr algn="ctr"/>
+            <a:r>
+              <a:rPr lang="en-US" dirty="0"/>
+              <a:t>Participant Response</a:t>
+            </a:r>
+          </a:p>
+        </p:txBody>
+      </p:sp>
+      <p:sp>
+        <p:nvSpPr>
+          <p:cNvPr id="21" name="TextBox 20">
+            <a:extLst>
+              <a:ext uri="{FF2B5EF4-FFF2-40B4-BE49-F238E27FC236}">
+                <a16:creationId xmlns:a16="http://schemas.microsoft.com/office/drawing/2014/main" id="{7679C256-E4AF-0C43-8D81-F71A8311EE1B}"/>
+              </a:ext>
+            </a:extLst>
+          </p:cNvPr>
+          <p:cNvSpPr txBox="1"/>
+          <p:nvPr/>
+        </p:nvSpPr>
+        <p:spPr>
+          <a:xfrm>
+            <a:off x="7561212" y="1722106"/>
+            <a:ext cx="335348" cy="523220"/>
+          </a:xfrm>
+          <a:prstGeom prst="rect">
+            <a:avLst/>
+          </a:prstGeom>
+          <a:noFill/>
+        </p:spPr>
+        <p:txBody>
+          <a:bodyPr wrap="none" rtlCol="0">
+            <a:spAutoFit/>
+          </a:bodyPr>
+          <a:lstStyle/>
+          <a:p>
+            <a:r>
+              <a:rPr lang="en-US" sz="2800" dirty="0">
+                <a:solidFill>
+                  <a:schemeClr val="accent1">
+                    <a:lumMod val="50000"/>
+                  </a:schemeClr>
+                </a:solidFill>
+              </a:rPr>
+              <a:t>L</a:t>
+            </a:r>
+          </a:p>
+        </p:txBody>
+      </p:sp>
+      <p:sp>
+        <p:nvSpPr>
+          <p:cNvPr id="22" name="TextBox 21">
+            <a:extLst>
+              <a:ext uri="{FF2B5EF4-FFF2-40B4-BE49-F238E27FC236}">
+                <a16:creationId xmlns:a16="http://schemas.microsoft.com/office/drawing/2014/main" id="{027223A0-EB5D-3842-9CA3-4BB6EF9143BD}"/>
+              </a:ext>
+            </a:extLst>
+          </p:cNvPr>
+          <p:cNvSpPr txBox="1"/>
+          <p:nvPr/>
+        </p:nvSpPr>
+        <p:spPr>
+          <a:xfrm>
+            <a:off x="8539538" y="2245326"/>
+            <a:ext cx="335348" cy="523220"/>
+          </a:xfrm>
+          <a:prstGeom prst="rect">
+            <a:avLst/>
+          </a:prstGeom>
+          <a:noFill/>
+        </p:spPr>
+        <p:txBody>
+          <a:bodyPr wrap="none" rtlCol="0">
+            <a:spAutoFit/>
+          </a:bodyPr>
+          <a:lstStyle/>
+          <a:p>
+            <a:r>
+              <a:rPr lang="en-US" sz="2800" dirty="0">
+                <a:solidFill>
+                  <a:schemeClr val="accent1">
+                    <a:lumMod val="50000"/>
+                  </a:schemeClr>
+                </a:solidFill>
+              </a:rPr>
+              <a:t>L</a:t>
+            </a:r>
+          </a:p>
+        </p:txBody>
+      </p:sp>
+      <p:sp>
+        <p:nvSpPr>
+          <p:cNvPr id="23" name="TextBox 22">
+            <a:extLst>
+              <a:ext uri="{FF2B5EF4-FFF2-40B4-BE49-F238E27FC236}">
+                <a16:creationId xmlns:a16="http://schemas.microsoft.com/office/drawing/2014/main" id="{E14D6871-4D68-C946-A2E5-567DDD050BA9}"/>
+              </a:ext>
+            </a:extLst>
+          </p:cNvPr>
+          <p:cNvSpPr txBox="1"/>
+          <p:nvPr/>
+        </p:nvSpPr>
+        <p:spPr>
+          <a:xfrm>
+            <a:off x="7225864" y="2756859"/>
+            <a:ext cx="335348" cy="523220"/>
+          </a:xfrm>
+          <a:prstGeom prst="rect">
+            <a:avLst/>
+          </a:prstGeom>
+          <a:noFill/>
+        </p:spPr>
+        <p:txBody>
+          <a:bodyPr wrap="none" rtlCol="0">
+            <a:spAutoFit/>
+          </a:bodyPr>
+          <a:lstStyle/>
+          <a:p>
+            <a:r>
+              <a:rPr lang="en-US" sz="2800" dirty="0">
+                <a:solidFill>
+                  <a:schemeClr val="accent1">
+                    <a:lumMod val="50000"/>
+                  </a:schemeClr>
+                </a:solidFill>
+              </a:rPr>
+              <a:t>L</a:t>
+            </a:r>
+          </a:p>
+        </p:txBody>
+      </p:sp>
+      <p:sp>
+        <p:nvSpPr>
+          <p:cNvPr id="24" name="TextBox 23">
+            <a:extLst>
+              <a:ext uri="{FF2B5EF4-FFF2-40B4-BE49-F238E27FC236}">
+                <a16:creationId xmlns:a16="http://schemas.microsoft.com/office/drawing/2014/main" id="{84073D70-B03C-024F-8FFB-24F17B22FE63}"/>
+              </a:ext>
+            </a:extLst>
+          </p:cNvPr>
+          <p:cNvSpPr txBox="1"/>
+          <p:nvPr/>
+        </p:nvSpPr>
+        <p:spPr>
+          <a:xfrm>
+            <a:off x="8050375" y="2494360"/>
+            <a:ext cx="335348" cy="523220"/>
+          </a:xfrm>
+          <a:prstGeom prst="rect">
+            <a:avLst/>
+          </a:prstGeom>
+          <a:noFill/>
+        </p:spPr>
+        <p:txBody>
+          <a:bodyPr wrap="none" rtlCol="0">
+            <a:spAutoFit/>
+          </a:bodyPr>
+          <a:lstStyle/>
+          <a:p>
+            <a:r>
+              <a:rPr lang="en-US" sz="2800" dirty="0">
+                <a:solidFill>
+                  <a:schemeClr val="accent1">
+                    <a:lumMod val="50000"/>
+                  </a:schemeClr>
+                </a:solidFill>
+              </a:rPr>
+              <a:t>L</a:t>
+            </a:r>
+          </a:p>
+        </p:txBody>
+      </p:sp>
+      <p:sp>
+        <p:nvSpPr>
+          <p:cNvPr id="26" name="Rounded Rectangle 25">
+            <a:extLst>
+              <a:ext uri="{FF2B5EF4-FFF2-40B4-BE49-F238E27FC236}">
+                <a16:creationId xmlns:a16="http://schemas.microsoft.com/office/drawing/2014/main" id="{9B53D7C2-1B8C-E84D-9E94-1ADEDB4A15B3}"/>
+              </a:ext>
+            </a:extLst>
+          </p:cNvPr>
+          <p:cNvSpPr/>
+          <p:nvPr/>
+        </p:nvSpPr>
+        <p:spPr>
+          <a:xfrm>
+            <a:off x="5005926" y="1678600"/>
+            <a:ext cx="1880999" cy="1712780"/>
+          </a:xfrm>
+          <a:prstGeom prst="roundRect">
+            <a:avLst/>
+          </a:prstGeom>
+          <a:solidFill>
+            <a:schemeClr val="accent1">
+              <a:lumMod val="75000"/>
+            </a:schemeClr>
+          </a:solidFill>
+          <a:ln w="25400">
+            <a:solidFill>
+              <a:schemeClr val="tx1"/>
+            </a:solidFill>
+          </a:ln>
+          <a:effectLst>
+            <a:outerShdw blurRad="50800" dist="38100" dir="2700000" algn="tl" rotWithShape="0">
+              <a:prstClr val="black">
+                <a:alpha val="40000"/>
+              </a:prstClr>
+            </a:outerShdw>
+          </a:effectLst>
+        </p:spPr>
+        <p:style>
+          <a:lnRef idx="2">
+            <a:schemeClr val="accent1">
+              <a:shade val="50000"/>
+            </a:schemeClr>
+          </a:lnRef>
+          <a:fillRef idx="1">
+            <a:schemeClr val="accent1"/>
+          </a:fillRef>
+          <a:effectRef idx="0">
+            <a:schemeClr val="accent1"/>
+          </a:effectRef>
+          <a:fontRef idx="minor">
+            <a:schemeClr val="lt1"/>
+          </a:fontRef>
+        </p:style>
+        <p:txBody>
+          <a:bodyPr rtlCol="0" anchor="ctr"/>
+          <a:lstStyle/>
+          <a:p>
+            <a:pPr algn="ctr"/>
+            <a:endParaRPr lang="en-US"/>
+          </a:p>
+        </p:txBody>
+      </p:sp>
+      <p:sp>
+        <p:nvSpPr>
+          <p:cNvPr id="29" name="TextBox 28">
+            <a:extLst>
+              <a:ext uri="{FF2B5EF4-FFF2-40B4-BE49-F238E27FC236}">
+                <a16:creationId xmlns:a16="http://schemas.microsoft.com/office/drawing/2014/main" id="{108AD96C-A962-0C4B-B54D-360D6E06067E}"/>
+              </a:ext>
+            </a:extLst>
+          </p:cNvPr>
+          <p:cNvSpPr txBox="1"/>
+          <p:nvPr/>
+        </p:nvSpPr>
+        <p:spPr>
+          <a:xfrm>
+            <a:off x="5282236" y="3831309"/>
+            <a:ext cx="1328377" cy="369332"/>
+          </a:xfrm>
+          <a:prstGeom prst="rect">
+            <a:avLst/>
+          </a:prstGeom>
+          <a:noFill/>
+        </p:spPr>
+        <p:txBody>
+          <a:bodyPr wrap="none" rtlCol="0">
+            <a:spAutoFit/>
+          </a:bodyPr>
+          <a:lstStyle/>
+          <a:p>
+            <a:r>
+              <a:rPr lang="en-US" dirty="0"/>
+              <a:t>Interruption</a:t>
+            </a:r>
+          </a:p>
+        </p:txBody>
+      </p:sp>
+      <p:sp>
+        <p:nvSpPr>
+          <p:cNvPr id="30" name="Rounded Rectangle 29">
+            <a:extLst>
+              <a:ext uri="{FF2B5EF4-FFF2-40B4-BE49-F238E27FC236}">
+                <a16:creationId xmlns:a16="http://schemas.microsoft.com/office/drawing/2014/main" id="{019C2EB9-E760-A940-A3C9-B6080AFD5F11}"/>
+              </a:ext>
+            </a:extLst>
+          </p:cNvPr>
+          <p:cNvSpPr/>
+          <p:nvPr/>
+        </p:nvSpPr>
+        <p:spPr>
+          <a:xfrm>
+            <a:off x="2817549" y="1655442"/>
+            <a:ext cx="1880999" cy="1712780"/>
+          </a:xfrm>
+          <a:prstGeom prst="roundRect">
+            <a:avLst/>
+          </a:prstGeom>
+          <a:solidFill>
+            <a:schemeClr val="bg1"/>
+          </a:solidFill>
+          <a:ln w="25400">
+            <a:solidFill>
+              <a:schemeClr val="tx1"/>
+            </a:solidFill>
+          </a:ln>
+          <a:effectLst>
+            <a:outerShdw blurRad="50800" dist="38100" dir="2700000" algn="tl" rotWithShape="0">
+              <a:prstClr val="black">
+                <a:alpha val="40000"/>
+              </a:prstClr>
+            </a:outerShdw>
+          </a:effectLst>
+        </p:spPr>
+        <p:style>
+          <a:lnRef idx="2">
+            <a:schemeClr val="accent1">
+              <a:shade val="50000"/>
+            </a:schemeClr>
+          </a:lnRef>
+          <a:fillRef idx="1">
+            <a:schemeClr val="accent1"/>
+          </a:fillRef>
+          <a:effectRef idx="0">
+            <a:schemeClr val="accent1"/>
+          </a:effectRef>
+          <a:fontRef idx="minor">
+            <a:schemeClr val="lt1"/>
+          </a:fontRef>
+        </p:style>
+        <p:txBody>
+          <a:bodyPr rtlCol="0" anchor="ctr"/>
+          <a:lstStyle/>
+          <a:p>
+            <a:pPr algn="ctr"/>
+            <a:endParaRPr lang="en-US"/>
+          </a:p>
+        </p:txBody>
+      </p:sp>
+      <p:sp>
+        <p:nvSpPr>
+          <p:cNvPr id="35" name="TextBox 34">
+            <a:extLst>
+              <a:ext uri="{FF2B5EF4-FFF2-40B4-BE49-F238E27FC236}">
+                <a16:creationId xmlns:a16="http://schemas.microsoft.com/office/drawing/2014/main" id="{6ECA65A4-259A-CA47-A57A-68C7C78330C5}"/>
+              </a:ext>
+            </a:extLst>
+          </p:cNvPr>
+          <p:cNvSpPr txBox="1"/>
+          <p:nvPr/>
+        </p:nvSpPr>
+        <p:spPr>
+          <a:xfrm>
+            <a:off x="3216996" y="1722106"/>
+            <a:ext cx="335348" cy="523220"/>
+          </a:xfrm>
+          <a:prstGeom prst="rect">
+            <a:avLst/>
+          </a:prstGeom>
+          <a:noFill/>
+        </p:spPr>
+        <p:txBody>
+          <a:bodyPr wrap="none" rtlCol="0">
+            <a:spAutoFit/>
+          </a:bodyPr>
+          <a:lstStyle/>
+          <a:p>
+            <a:r>
+              <a:rPr lang="en-US" sz="2800" dirty="0">
+                <a:solidFill>
+                  <a:schemeClr val="accent1">
+                    <a:lumMod val="50000"/>
+                  </a:schemeClr>
+                </a:solidFill>
+              </a:rPr>
+              <a:t>L</a:t>
+            </a:r>
+          </a:p>
+        </p:txBody>
+      </p:sp>
+      <p:sp>
+        <p:nvSpPr>
+          <p:cNvPr id="36" name="TextBox 35">
+            <a:extLst>
+              <a:ext uri="{FF2B5EF4-FFF2-40B4-BE49-F238E27FC236}">
+                <a16:creationId xmlns:a16="http://schemas.microsoft.com/office/drawing/2014/main" id="{5C09F7CA-F7B9-7B4E-BB3B-D0E564BA70EB}"/>
+              </a:ext>
+            </a:extLst>
+          </p:cNvPr>
+          <p:cNvSpPr txBox="1"/>
+          <p:nvPr/>
+        </p:nvSpPr>
+        <p:spPr>
+          <a:xfrm>
+            <a:off x="4195322" y="2245326"/>
+            <a:ext cx="335348" cy="523220"/>
+          </a:xfrm>
+          <a:prstGeom prst="rect">
+            <a:avLst/>
+          </a:prstGeom>
+          <a:noFill/>
+        </p:spPr>
+        <p:txBody>
+          <a:bodyPr wrap="none" rtlCol="0">
+            <a:spAutoFit/>
+          </a:bodyPr>
+          <a:lstStyle/>
+          <a:p>
+            <a:r>
+              <a:rPr lang="en-US" sz="2800" dirty="0">
+                <a:solidFill>
+                  <a:schemeClr val="accent1">
+                    <a:lumMod val="50000"/>
+                  </a:schemeClr>
+                </a:solidFill>
+              </a:rPr>
+              <a:t>L</a:t>
+            </a:r>
+          </a:p>
+        </p:txBody>
+      </p:sp>
+      <p:sp>
+        <p:nvSpPr>
+          <p:cNvPr id="37" name="TextBox 36">
+            <a:extLst>
+              <a:ext uri="{FF2B5EF4-FFF2-40B4-BE49-F238E27FC236}">
+                <a16:creationId xmlns:a16="http://schemas.microsoft.com/office/drawing/2014/main" id="{A19032F4-E6C0-9944-9E5B-B49BF7517E4F}"/>
+              </a:ext>
+            </a:extLst>
+          </p:cNvPr>
+          <p:cNvSpPr txBox="1"/>
+          <p:nvPr/>
+        </p:nvSpPr>
+        <p:spPr>
+          <a:xfrm>
+            <a:off x="2881648" y="2756859"/>
+            <a:ext cx="335348" cy="523220"/>
+          </a:xfrm>
+          <a:prstGeom prst="rect">
+            <a:avLst/>
+          </a:prstGeom>
+          <a:noFill/>
+        </p:spPr>
+        <p:txBody>
+          <a:bodyPr wrap="none" rtlCol="0">
+            <a:spAutoFit/>
+          </a:bodyPr>
+          <a:lstStyle/>
+          <a:p>
+            <a:r>
+              <a:rPr lang="en-US" sz="2800" dirty="0">
+                <a:solidFill>
+                  <a:schemeClr val="accent1">
+                    <a:lumMod val="50000"/>
+                  </a:schemeClr>
+                </a:solidFill>
+              </a:rPr>
+              <a:t>L</a:t>
+            </a:r>
+          </a:p>
+        </p:txBody>
+      </p:sp>
+      <p:sp>
+        <p:nvSpPr>
+          <p:cNvPr id="38" name="TextBox 37">
+            <a:extLst>
+              <a:ext uri="{FF2B5EF4-FFF2-40B4-BE49-F238E27FC236}">
+                <a16:creationId xmlns:a16="http://schemas.microsoft.com/office/drawing/2014/main" id="{4D69AA52-3B3A-1244-B4C4-B698FF7E155E}"/>
+              </a:ext>
+            </a:extLst>
+          </p:cNvPr>
+          <p:cNvSpPr txBox="1"/>
+          <p:nvPr/>
+        </p:nvSpPr>
+        <p:spPr>
+          <a:xfrm>
+            <a:off x="3706159" y="2494360"/>
+            <a:ext cx="335348" cy="523220"/>
+          </a:xfrm>
+          <a:prstGeom prst="rect">
+            <a:avLst/>
+          </a:prstGeom>
+          <a:noFill/>
+        </p:spPr>
+        <p:txBody>
+          <a:bodyPr wrap="none" rtlCol="0">
+            <a:spAutoFit/>
+          </a:bodyPr>
+          <a:lstStyle/>
+          <a:p>
+            <a:r>
+              <a:rPr lang="en-US" sz="2800" dirty="0">
+                <a:solidFill>
+                  <a:schemeClr val="accent1">
+                    <a:lumMod val="50000"/>
+                  </a:schemeClr>
+                </a:solidFill>
+              </a:rPr>
+              <a:t>L</a:t>
+            </a:r>
+          </a:p>
+        </p:txBody>
+      </p:sp>
+      <p:sp>
+        <p:nvSpPr>
+          <p:cNvPr id="39" name="TextBox 38">
+            <a:extLst>
+              <a:ext uri="{FF2B5EF4-FFF2-40B4-BE49-F238E27FC236}">
+                <a16:creationId xmlns:a16="http://schemas.microsoft.com/office/drawing/2014/main" id="{FF27C823-2F35-BE4A-996B-179E469BC8FE}"/>
+              </a:ext>
+            </a:extLst>
+          </p:cNvPr>
+          <p:cNvSpPr txBox="1"/>
+          <p:nvPr/>
+        </p:nvSpPr>
+        <p:spPr>
+          <a:xfrm>
+            <a:off x="2957773" y="3853134"/>
+            <a:ext cx="1433919" cy="369332"/>
+          </a:xfrm>
+          <a:prstGeom prst="rect">
+            <a:avLst/>
+          </a:prstGeom>
+          <a:noFill/>
+        </p:spPr>
+        <p:txBody>
+          <a:bodyPr wrap="none" rtlCol="0">
+            <a:spAutoFit/>
+          </a:bodyPr>
+          <a:lstStyle/>
+          <a:p>
+            <a:r>
+              <a:rPr lang="en-US" dirty="0"/>
+              <a:t>Initial Display</a:t>
+            </a:r>
+          </a:p>
+        </p:txBody>
+      </p:sp>
+    </p:spTree>
+    <p:extLst>
+      <p:ext uri="{BB962C8B-B14F-4D97-AF65-F5344CB8AC3E}">
+        <p14:creationId xmlns:p14="http://schemas.microsoft.com/office/powerpoint/2010/main" val="1730404450"/>
+      </p:ext>
+    </p:extLst>
+  </p:cSld>
+  <p:clrMapOvr>
+    <a:masterClrMapping/>
+  </p:clrMapOvr>
+</p:sld>
+</file>
+
 <file path=ppt/theme/theme1.xml><?xml version="1.0" encoding="utf-8"?>
 <a:theme xmlns:a="http://schemas.openxmlformats.org/drawingml/2006/main" name="Office Theme">
   <a:themeElements>

</xml_diff>

<commit_message>
Revert "Fixing typos and added a figure that had been missed."
This reverts commit abc0a8a8541d35a16f88aefd3075492d270b59ea.
</commit_message>
<xml_diff>
--- a/bookdown source/files/ppt/Examples for Bookdown.pptx
+++ b/bookdown source/files/ppt/Examples for Bookdown.pptx
@@ -9,7 +9,6 @@
     <p:sldId id="257" r:id="rId3"/>
     <p:sldId id="259" r:id="rId4"/>
     <p:sldId id="258" r:id="rId5"/>
-    <p:sldId id="260" r:id="rId6"/>
   </p:sldIdLst>
   <p:sldSz cx="12192000" cy="6858000"/>
   <p:notesSz cx="6858000" cy="9144000"/>
@@ -263,7 +262,7 @@
           <a:p>
             <a:fld id="{63889709-0435-BE4C-897A-4998963CC9D4}" type="datetimeFigureOut">
               <a:rPr lang="en-US" smtClean="0"/>
-              <a:t>11/1/19</a:t>
+              <a:t>10/29/19</a:t>
             </a:fld>
             <a:endParaRPr lang="en-US"/>
           </a:p>
@@ -461,7 +460,7 @@
           <a:p>
             <a:fld id="{63889709-0435-BE4C-897A-4998963CC9D4}" type="datetimeFigureOut">
               <a:rPr lang="en-US" smtClean="0"/>
-              <a:t>11/1/19</a:t>
+              <a:t>10/29/19</a:t>
             </a:fld>
             <a:endParaRPr lang="en-US"/>
           </a:p>
@@ -669,7 +668,7 @@
           <a:p>
             <a:fld id="{63889709-0435-BE4C-897A-4998963CC9D4}" type="datetimeFigureOut">
               <a:rPr lang="en-US" smtClean="0"/>
-              <a:t>11/1/19</a:t>
+              <a:t>10/29/19</a:t>
             </a:fld>
             <a:endParaRPr lang="en-US"/>
           </a:p>
@@ -867,7 +866,7 @@
           <a:p>
             <a:fld id="{63889709-0435-BE4C-897A-4998963CC9D4}" type="datetimeFigureOut">
               <a:rPr lang="en-US" smtClean="0"/>
-              <a:t>11/1/19</a:t>
+              <a:t>10/29/19</a:t>
             </a:fld>
             <a:endParaRPr lang="en-US"/>
           </a:p>
@@ -1142,7 +1141,7 @@
           <a:p>
             <a:fld id="{63889709-0435-BE4C-897A-4998963CC9D4}" type="datetimeFigureOut">
               <a:rPr lang="en-US" smtClean="0"/>
-              <a:t>11/1/19</a:t>
+              <a:t>10/29/19</a:t>
             </a:fld>
             <a:endParaRPr lang="en-US"/>
           </a:p>
@@ -1407,7 +1406,7 @@
           <a:p>
             <a:fld id="{63889709-0435-BE4C-897A-4998963CC9D4}" type="datetimeFigureOut">
               <a:rPr lang="en-US" smtClean="0"/>
-              <a:t>11/1/19</a:t>
+              <a:t>10/29/19</a:t>
             </a:fld>
             <a:endParaRPr lang="en-US"/>
           </a:p>
@@ -1819,7 +1818,7 @@
           <a:p>
             <a:fld id="{63889709-0435-BE4C-897A-4998963CC9D4}" type="datetimeFigureOut">
               <a:rPr lang="en-US" smtClean="0"/>
-              <a:t>11/1/19</a:t>
+              <a:t>10/29/19</a:t>
             </a:fld>
             <a:endParaRPr lang="en-US"/>
           </a:p>
@@ -1960,7 +1959,7 @@
           <a:p>
             <a:fld id="{63889709-0435-BE4C-897A-4998963CC9D4}" type="datetimeFigureOut">
               <a:rPr lang="en-US" smtClean="0"/>
-              <a:t>11/1/19</a:t>
+              <a:t>10/29/19</a:t>
             </a:fld>
             <a:endParaRPr lang="en-US"/>
           </a:p>
@@ -2073,7 +2072,7 @@
           <a:p>
             <a:fld id="{63889709-0435-BE4C-897A-4998963CC9D4}" type="datetimeFigureOut">
               <a:rPr lang="en-US" smtClean="0"/>
-              <a:t>11/1/19</a:t>
+              <a:t>10/29/19</a:t>
             </a:fld>
             <a:endParaRPr lang="en-US"/>
           </a:p>
@@ -2384,7 +2383,7 @@
           <a:p>
             <a:fld id="{63889709-0435-BE4C-897A-4998963CC9D4}" type="datetimeFigureOut">
               <a:rPr lang="en-US" smtClean="0"/>
-              <a:t>11/1/19</a:t>
+              <a:t>10/29/19</a:t>
             </a:fld>
             <a:endParaRPr lang="en-US"/>
           </a:p>
@@ -2672,7 +2671,7 @@
           <a:p>
             <a:fld id="{63889709-0435-BE4C-897A-4998963CC9D4}" type="datetimeFigureOut">
               <a:rPr lang="en-US" smtClean="0"/>
-              <a:t>11/1/19</a:t>
+              <a:t>10/29/19</a:t>
             </a:fld>
             <a:endParaRPr lang="en-US"/>
           </a:p>
@@ -2913,7 +2912,7 @@
           <a:p>
             <a:fld id="{63889709-0435-BE4C-897A-4998963CC9D4}" type="datetimeFigureOut">
               <a:rPr lang="en-US" smtClean="0"/>
-              <a:t>11/1/19</a:t>
+              <a:t>10/29/19</a:t>
             </a:fld>
             <a:endParaRPr lang="en-US"/>
           </a:p>
@@ -6875,872 +6874,6 @@
 </p:sld>
 </file>
 
-<file path=ppt/slides/slide5.xml><?xml version="1.0" encoding="utf-8"?>
-<p:sld xmlns:a="http://schemas.openxmlformats.org/drawingml/2006/main" xmlns:r="http://schemas.openxmlformats.org/officeDocument/2006/relationships" xmlns:p="http://schemas.openxmlformats.org/presentationml/2006/main">
-  <p:cSld>
-    <p:spTree>
-      <p:nvGrpSpPr>
-        <p:cNvPr id="1" name=""/>
-        <p:cNvGrpSpPr/>
-        <p:nvPr/>
-      </p:nvGrpSpPr>
-      <p:grpSpPr>
-        <a:xfrm>
-          <a:off x="0" y="0"/>
-          <a:ext cx="0" cy="0"/>
-          <a:chOff x="0" y="0"/>
-          <a:chExt cx="0" cy="0"/>
-        </a:xfrm>
-      </p:grpSpPr>
-      <p:sp>
-        <p:nvSpPr>
-          <p:cNvPr id="4" name="Rounded Rectangle 3">
-            <a:extLst>
-              <a:ext uri="{FF2B5EF4-FFF2-40B4-BE49-F238E27FC236}">
-                <a16:creationId xmlns:a16="http://schemas.microsoft.com/office/drawing/2014/main" id="{397B3896-358B-E347-8BDE-B5C6208FEE2F}"/>
-              </a:ext>
-            </a:extLst>
-          </p:cNvPr>
-          <p:cNvSpPr/>
-          <p:nvPr/>
-        </p:nvSpPr>
-        <p:spPr>
-          <a:xfrm>
-            <a:off x="760866" y="1678600"/>
-            <a:ext cx="1880999" cy="1712780"/>
-          </a:xfrm>
-          <a:prstGeom prst="roundRect">
-            <a:avLst/>
-          </a:prstGeom>
-          <a:solidFill>
-            <a:schemeClr val="bg1"/>
-          </a:solidFill>
-          <a:ln w="25400">
-            <a:solidFill>
-              <a:schemeClr val="tx1"/>
-            </a:solidFill>
-          </a:ln>
-          <a:effectLst>
-            <a:outerShdw blurRad="50800" dist="38100" dir="2700000" algn="tl" rotWithShape="0">
-              <a:prstClr val="black">
-                <a:alpha val="40000"/>
-              </a:prstClr>
-            </a:outerShdw>
-          </a:effectLst>
-        </p:spPr>
-        <p:style>
-          <a:lnRef idx="2">
-            <a:schemeClr val="accent1">
-              <a:shade val="50000"/>
-            </a:schemeClr>
-          </a:lnRef>
-          <a:fillRef idx="1">
-            <a:schemeClr val="accent1"/>
-          </a:fillRef>
-          <a:effectRef idx="0">
-            <a:schemeClr val="accent1"/>
-          </a:effectRef>
-          <a:fontRef idx="minor">
-            <a:schemeClr val="lt1"/>
-          </a:fontRef>
-        </p:style>
-        <p:txBody>
-          <a:bodyPr rtlCol="0" anchor="ctr"/>
-          <a:lstStyle/>
-          <a:p>
-            <a:pPr algn="ctr"/>
-            <a:endParaRPr lang="en-US"/>
-          </a:p>
-        </p:txBody>
-      </p:sp>
-      <p:sp>
-        <p:nvSpPr>
-          <p:cNvPr id="5" name="Rounded Rectangle 4">
-            <a:extLst>
-              <a:ext uri="{FF2B5EF4-FFF2-40B4-BE49-F238E27FC236}">
-                <a16:creationId xmlns:a16="http://schemas.microsoft.com/office/drawing/2014/main" id="{376C7AA9-F7B5-DF4E-A2F2-F42E758583B5}"/>
-              </a:ext>
-            </a:extLst>
-          </p:cNvPr>
-          <p:cNvSpPr/>
-          <p:nvPr/>
-        </p:nvSpPr>
-        <p:spPr>
-          <a:xfrm>
-            <a:off x="7225864" y="1678600"/>
-            <a:ext cx="1880999" cy="1712780"/>
-          </a:xfrm>
-          <a:prstGeom prst="roundRect">
-            <a:avLst/>
-          </a:prstGeom>
-          <a:solidFill>
-            <a:schemeClr val="bg1"/>
-          </a:solidFill>
-          <a:ln w="25400">
-            <a:solidFill>
-              <a:schemeClr val="tx1"/>
-            </a:solidFill>
-          </a:ln>
-          <a:effectLst>
-            <a:outerShdw blurRad="50800" dist="38100" dir="2700000" algn="tl" rotWithShape="0">
-              <a:prstClr val="black">
-                <a:alpha val="40000"/>
-              </a:prstClr>
-            </a:outerShdw>
-          </a:effectLst>
-        </p:spPr>
-        <p:style>
-          <a:lnRef idx="2">
-            <a:schemeClr val="accent1">
-              <a:shade val="50000"/>
-            </a:schemeClr>
-          </a:lnRef>
-          <a:fillRef idx="1">
-            <a:schemeClr val="accent1"/>
-          </a:fillRef>
-          <a:effectRef idx="0">
-            <a:schemeClr val="accent1"/>
-          </a:effectRef>
-          <a:fontRef idx="minor">
-            <a:schemeClr val="lt1"/>
-          </a:fontRef>
-        </p:style>
-        <p:txBody>
-          <a:bodyPr rtlCol="0" anchor="ctr"/>
-          <a:lstStyle/>
-          <a:p>
-            <a:pPr algn="ctr"/>
-            <a:endParaRPr lang="en-US"/>
-          </a:p>
-        </p:txBody>
-      </p:sp>
-      <p:sp>
-        <p:nvSpPr>
-          <p:cNvPr id="8" name="TextBox 7">
-            <a:extLst>
-              <a:ext uri="{FF2B5EF4-FFF2-40B4-BE49-F238E27FC236}">
-                <a16:creationId xmlns:a16="http://schemas.microsoft.com/office/drawing/2014/main" id="{C7137D25-25A9-654E-A6EA-35DBAAFC9423}"/>
-              </a:ext>
-            </a:extLst>
-          </p:cNvPr>
-          <p:cNvSpPr txBox="1"/>
-          <p:nvPr/>
-        </p:nvSpPr>
-        <p:spPr>
-          <a:xfrm>
-            <a:off x="1516058" y="2172355"/>
-            <a:ext cx="370614" cy="523220"/>
-          </a:xfrm>
-          <a:prstGeom prst="rect">
-            <a:avLst/>
-          </a:prstGeom>
-          <a:noFill/>
-        </p:spPr>
-        <p:txBody>
-          <a:bodyPr wrap="none" rtlCol="0">
-            <a:spAutoFit/>
-          </a:bodyPr>
-          <a:lstStyle/>
-          <a:p>
-            <a:r>
-              <a:rPr lang="en-US" sz="2800" dirty="0"/>
-              <a:t>X</a:t>
-            </a:r>
-          </a:p>
-        </p:txBody>
-      </p:sp>
-      <p:cxnSp>
-        <p:nvCxnSpPr>
-          <p:cNvPr id="14" name="Straight Arrow Connector 13">
-            <a:extLst>
-              <a:ext uri="{FF2B5EF4-FFF2-40B4-BE49-F238E27FC236}">
-                <a16:creationId xmlns:a16="http://schemas.microsoft.com/office/drawing/2014/main" id="{A4E22BF7-1C79-8A40-95F0-F78833575F53}"/>
-              </a:ext>
-            </a:extLst>
-          </p:cNvPr>
-          <p:cNvCxnSpPr>
-            <a:cxnSpLocks/>
-          </p:cNvCxnSpPr>
-          <p:nvPr/>
-        </p:nvCxnSpPr>
-        <p:spPr>
-          <a:xfrm>
-            <a:off x="601884" y="3693771"/>
-            <a:ext cx="8504980" cy="0"/>
-          </a:xfrm>
-          <a:prstGeom prst="straightConnector1">
-            <a:avLst/>
-          </a:prstGeom>
-          <a:ln w="60325">
-            <a:solidFill>
-              <a:schemeClr val="tx1"/>
-            </a:solidFill>
-            <a:tailEnd type="triangle"/>
-          </a:ln>
-          <a:effectLst>
-            <a:outerShdw blurRad="50800" dist="38100" dir="2700000" algn="tl" rotWithShape="0">
-              <a:prstClr val="black">
-                <a:alpha val="40000"/>
-              </a:prstClr>
-            </a:outerShdw>
-          </a:effectLst>
-        </p:spPr>
-        <p:style>
-          <a:lnRef idx="1">
-            <a:schemeClr val="accent1"/>
-          </a:lnRef>
-          <a:fillRef idx="0">
-            <a:schemeClr val="accent1"/>
-          </a:fillRef>
-          <a:effectRef idx="0">
-            <a:schemeClr val="accent1"/>
-          </a:effectRef>
-          <a:fontRef idx="minor">
-            <a:schemeClr val="tx1"/>
-          </a:fontRef>
-        </p:style>
-      </p:cxnSp>
-      <p:sp>
-        <p:nvSpPr>
-          <p:cNvPr id="15" name="TextBox 14">
-            <a:extLst>
-              <a:ext uri="{FF2B5EF4-FFF2-40B4-BE49-F238E27FC236}">
-                <a16:creationId xmlns:a16="http://schemas.microsoft.com/office/drawing/2014/main" id="{50E541D9-B439-874C-A5A7-E76532089C44}"/>
-              </a:ext>
-            </a:extLst>
-          </p:cNvPr>
-          <p:cNvSpPr txBox="1"/>
-          <p:nvPr/>
-        </p:nvSpPr>
-        <p:spPr>
-          <a:xfrm>
-            <a:off x="1023487" y="3853045"/>
-            <a:ext cx="1355756" cy="369332"/>
-          </a:xfrm>
-          <a:prstGeom prst="rect">
-            <a:avLst/>
-          </a:prstGeom>
-          <a:noFill/>
-        </p:spPr>
-        <p:txBody>
-          <a:bodyPr wrap="none" rtlCol="0">
-            <a:spAutoFit/>
-          </a:bodyPr>
-          <a:lstStyle/>
-          <a:p>
-            <a:r>
-              <a:rPr lang="en-US" dirty="0"/>
-              <a:t>Display Start</a:t>
-            </a:r>
-          </a:p>
-        </p:txBody>
-      </p:sp>
-      <p:sp>
-        <p:nvSpPr>
-          <p:cNvPr id="19" name="TextBox 18">
-            <a:extLst>
-              <a:ext uri="{FF2B5EF4-FFF2-40B4-BE49-F238E27FC236}">
-                <a16:creationId xmlns:a16="http://schemas.microsoft.com/office/drawing/2014/main" id="{0C8F5B31-C805-7944-91FE-5A438061E29C}"/>
-              </a:ext>
-            </a:extLst>
-          </p:cNvPr>
-          <p:cNvSpPr txBox="1"/>
-          <p:nvPr/>
-        </p:nvSpPr>
-        <p:spPr>
-          <a:xfrm>
-            <a:off x="7347876" y="3811497"/>
-            <a:ext cx="1633845" cy="369332"/>
-          </a:xfrm>
-          <a:prstGeom prst="rect">
-            <a:avLst/>
-          </a:prstGeom>
-          <a:noFill/>
-        </p:spPr>
-        <p:txBody>
-          <a:bodyPr wrap="none" rtlCol="0">
-            <a:spAutoFit/>
-          </a:bodyPr>
-          <a:lstStyle/>
-          <a:p>
-            <a:r>
-              <a:rPr lang="en-US" dirty="0"/>
-              <a:t>Display Returns</a:t>
-            </a:r>
-          </a:p>
-        </p:txBody>
-      </p:sp>
-      <p:sp>
-        <p:nvSpPr>
-          <p:cNvPr id="20" name="TextBox 19">
-            <a:extLst>
-              <a:ext uri="{FF2B5EF4-FFF2-40B4-BE49-F238E27FC236}">
-                <a16:creationId xmlns:a16="http://schemas.microsoft.com/office/drawing/2014/main" id="{750B2AF3-E3CE-6246-A251-B874D4CBD889}"/>
-              </a:ext>
-            </a:extLst>
-          </p:cNvPr>
-          <p:cNvSpPr txBox="1"/>
-          <p:nvPr/>
-        </p:nvSpPr>
-        <p:spPr>
-          <a:xfrm>
-            <a:off x="9206878" y="3391380"/>
-            <a:ext cx="1191168" cy="646331"/>
-          </a:xfrm>
-          <a:prstGeom prst="rect">
-            <a:avLst/>
-          </a:prstGeom>
-          <a:noFill/>
-        </p:spPr>
-        <p:txBody>
-          <a:bodyPr wrap="square" rtlCol="0">
-            <a:spAutoFit/>
-          </a:bodyPr>
-          <a:lstStyle/>
-          <a:p>
-            <a:pPr algn="ctr"/>
-            <a:r>
-              <a:rPr lang="en-US" dirty="0"/>
-              <a:t>Participant Response</a:t>
-            </a:r>
-          </a:p>
-        </p:txBody>
-      </p:sp>
-      <p:sp>
-        <p:nvSpPr>
-          <p:cNvPr id="21" name="TextBox 20">
-            <a:extLst>
-              <a:ext uri="{FF2B5EF4-FFF2-40B4-BE49-F238E27FC236}">
-                <a16:creationId xmlns:a16="http://schemas.microsoft.com/office/drawing/2014/main" id="{7679C256-E4AF-0C43-8D81-F71A8311EE1B}"/>
-              </a:ext>
-            </a:extLst>
-          </p:cNvPr>
-          <p:cNvSpPr txBox="1"/>
-          <p:nvPr/>
-        </p:nvSpPr>
-        <p:spPr>
-          <a:xfrm>
-            <a:off x="7561212" y="1722106"/>
-            <a:ext cx="335348" cy="523220"/>
-          </a:xfrm>
-          <a:prstGeom prst="rect">
-            <a:avLst/>
-          </a:prstGeom>
-          <a:noFill/>
-        </p:spPr>
-        <p:txBody>
-          <a:bodyPr wrap="none" rtlCol="0">
-            <a:spAutoFit/>
-          </a:bodyPr>
-          <a:lstStyle/>
-          <a:p>
-            <a:r>
-              <a:rPr lang="en-US" sz="2800" dirty="0">
-                <a:solidFill>
-                  <a:schemeClr val="accent1">
-                    <a:lumMod val="50000"/>
-                  </a:schemeClr>
-                </a:solidFill>
-              </a:rPr>
-              <a:t>L</a:t>
-            </a:r>
-          </a:p>
-        </p:txBody>
-      </p:sp>
-      <p:sp>
-        <p:nvSpPr>
-          <p:cNvPr id="22" name="TextBox 21">
-            <a:extLst>
-              <a:ext uri="{FF2B5EF4-FFF2-40B4-BE49-F238E27FC236}">
-                <a16:creationId xmlns:a16="http://schemas.microsoft.com/office/drawing/2014/main" id="{027223A0-EB5D-3842-9CA3-4BB6EF9143BD}"/>
-              </a:ext>
-            </a:extLst>
-          </p:cNvPr>
-          <p:cNvSpPr txBox="1"/>
-          <p:nvPr/>
-        </p:nvSpPr>
-        <p:spPr>
-          <a:xfrm>
-            <a:off x="8539538" y="2245326"/>
-            <a:ext cx="335348" cy="523220"/>
-          </a:xfrm>
-          <a:prstGeom prst="rect">
-            <a:avLst/>
-          </a:prstGeom>
-          <a:noFill/>
-        </p:spPr>
-        <p:txBody>
-          <a:bodyPr wrap="none" rtlCol="0">
-            <a:spAutoFit/>
-          </a:bodyPr>
-          <a:lstStyle/>
-          <a:p>
-            <a:r>
-              <a:rPr lang="en-US" sz="2800" dirty="0">
-                <a:solidFill>
-                  <a:schemeClr val="accent1">
-                    <a:lumMod val="50000"/>
-                  </a:schemeClr>
-                </a:solidFill>
-              </a:rPr>
-              <a:t>L</a:t>
-            </a:r>
-          </a:p>
-        </p:txBody>
-      </p:sp>
-      <p:sp>
-        <p:nvSpPr>
-          <p:cNvPr id="23" name="TextBox 22">
-            <a:extLst>
-              <a:ext uri="{FF2B5EF4-FFF2-40B4-BE49-F238E27FC236}">
-                <a16:creationId xmlns:a16="http://schemas.microsoft.com/office/drawing/2014/main" id="{E14D6871-4D68-C946-A2E5-567DDD050BA9}"/>
-              </a:ext>
-            </a:extLst>
-          </p:cNvPr>
-          <p:cNvSpPr txBox="1"/>
-          <p:nvPr/>
-        </p:nvSpPr>
-        <p:spPr>
-          <a:xfrm>
-            <a:off x="7225864" y="2756859"/>
-            <a:ext cx="335348" cy="523220"/>
-          </a:xfrm>
-          <a:prstGeom prst="rect">
-            <a:avLst/>
-          </a:prstGeom>
-          <a:noFill/>
-        </p:spPr>
-        <p:txBody>
-          <a:bodyPr wrap="none" rtlCol="0">
-            <a:spAutoFit/>
-          </a:bodyPr>
-          <a:lstStyle/>
-          <a:p>
-            <a:r>
-              <a:rPr lang="en-US" sz="2800" dirty="0">
-                <a:solidFill>
-                  <a:schemeClr val="accent1">
-                    <a:lumMod val="50000"/>
-                  </a:schemeClr>
-                </a:solidFill>
-              </a:rPr>
-              <a:t>L</a:t>
-            </a:r>
-          </a:p>
-        </p:txBody>
-      </p:sp>
-      <p:sp>
-        <p:nvSpPr>
-          <p:cNvPr id="24" name="TextBox 23">
-            <a:extLst>
-              <a:ext uri="{FF2B5EF4-FFF2-40B4-BE49-F238E27FC236}">
-                <a16:creationId xmlns:a16="http://schemas.microsoft.com/office/drawing/2014/main" id="{84073D70-B03C-024F-8FFB-24F17B22FE63}"/>
-              </a:ext>
-            </a:extLst>
-          </p:cNvPr>
-          <p:cNvSpPr txBox="1"/>
-          <p:nvPr/>
-        </p:nvSpPr>
-        <p:spPr>
-          <a:xfrm>
-            <a:off x="8050375" y="2494360"/>
-            <a:ext cx="335348" cy="523220"/>
-          </a:xfrm>
-          <a:prstGeom prst="rect">
-            <a:avLst/>
-          </a:prstGeom>
-          <a:noFill/>
-        </p:spPr>
-        <p:txBody>
-          <a:bodyPr wrap="none" rtlCol="0">
-            <a:spAutoFit/>
-          </a:bodyPr>
-          <a:lstStyle/>
-          <a:p>
-            <a:r>
-              <a:rPr lang="en-US" sz="2800" dirty="0">
-                <a:solidFill>
-                  <a:schemeClr val="accent1">
-                    <a:lumMod val="50000"/>
-                  </a:schemeClr>
-                </a:solidFill>
-              </a:rPr>
-              <a:t>L</a:t>
-            </a:r>
-          </a:p>
-        </p:txBody>
-      </p:sp>
-      <p:sp>
-        <p:nvSpPr>
-          <p:cNvPr id="26" name="Rounded Rectangle 25">
-            <a:extLst>
-              <a:ext uri="{FF2B5EF4-FFF2-40B4-BE49-F238E27FC236}">
-                <a16:creationId xmlns:a16="http://schemas.microsoft.com/office/drawing/2014/main" id="{9B53D7C2-1B8C-E84D-9E94-1ADEDB4A15B3}"/>
-              </a:ext>
-            </a:extLst>
-          </p:cNvPr>
-          <p:cNvSpPr/>
-          <p:nvPr/>
-        </p:nvSpPr>
-        <p:spPr>
-          <a:xfrm>
-            <a:off x="5005926" y="1678600"/>
-            <a:ext cx="1880999" cy="1712780"/>
-          </a:xfrm>
-          <a:prstGeom prst="roundRect">
-            <a:avLst/>
-          </a:prstGeom>
-          <a:solidFill>
-            <a:schemeClr val="accent1">
-              <a:lumMod val="75000"/>
-            </a:schemeClr>
-          </a:solidFill>
-          <a:ln w="25400">
-            <a:solidFill>
-              <a:schemeClr val="tx1"/>
-            </a:solidFill>
-          </a:ln>
-          <a:effectLst>
-            <a:outerShdw blurRad="50800" dist="38100" dir="2700000" algn="tl" rotWithShape="0">
-              <a:prstClr val="black">
-                <a:alpha val="40000"/>
-              </a:prstClr>
-            </a:outerShdw>
-          </a:effectLst>
-        </p:spPr>
-        <p:style>
-          <a:lnRef idx="2">
-            <a:schemeClr val="accent1">
-              <a:shade val="50000"/>
-            </a:schemeClr>
-          </a:lnRef>
-          <a:fillRef idx="1">
-            <a:schemeClr val="accent1"/>
-          </a:fillRef>
-          <a:effectRef idx="0">
-            <a:schemeClr val="accent1"/>
-          </a:effectRef>
-          <a:fontRef idx="minor">
-            <a:schemeClr val="lt1"/>
-          </a:fontRef>
-        </p:style>
-        <p:txBody>
-          <a:bodyPr rtlCol="0" anchor="ctr"/>
-          <a:lstStyle/>
-          <a:p>
-            <a:pPr algn="ctr"/>
-            <a:endParaRPr lang="en-US"/>
-          </a:p>
-        </p:txBody>
-      </p:sp>
-      <p:sp>
-        <p:nvSpPr>
-          <p:cNvPr id="29" name="TextBox 28">
-            <a:extLst>
-              <a:ext uri="{FF2B5EF4-FFF2-40B4-BE49-F238E27FC236}">
-                <a16:creationId xmlns:a16="http://schemas.microsoft.com/office/drawing/2014/main" id="{108AD96C-A962-0C4B-B54D-360D6E06067E}"/>
-              </a:ext>
-            </a:extLst>
-          </p:cNvPr>
-          <p:cNvSpPr txBox="1"/>
-          <p:nvPr/>
-        </p:nvSpPr>
-        <p:spPr>
-          <a:xfrm>
-            <a:off x="5282236" y="3831309"/>
-            <a:ext cx="1328377" cy="369332"/>
-          </a:xfrm>
-          <a:prstGeom prst="rect">
-            <a:avLst/>
-          </a:prstGeom>
-          <a:noFill/>
-        </p:spPr>
-        <p:txBody>
-          <a:bodyPr wrap="none" rtlCol="0">
-            <a:spAutoFit/>
-          </a:bodyPr>
-          <a:lstStyle/>
-          <a:p>
-            <a:r>
-              <a:rPr lang="en-US" dirty="0"/>
-              <a:t>Interruption</a:t>
-            </a:r>
-          </a:p>
-        </p:txBody>
-      </p:sp>
-      <p:sp>
-        <p:nvSpPr>
-          <p:cNvPr id="30" name="Rounded Rectangle 29">
-            <a:extLst>
-              <a:ext uri="{FF2B5EF4-FFF2-40B4-BE49-F238E27FC236}">
-                <a16:creationId xmlns:a16="http://schemas.microsoft.com/office/drawing/2014/main" id="{019C2EB9-E760-A940-A3C9-B6080AFD5F11}"/>
-              </a:ext>
-            </a:extLst>
-          </p:cNvPr>
-          <p:cNvSpPr/>
-          <p:nvPr/>
-        </p:nvSpPr>
-        <p:spPr>
-          <a:xfrm>
-            <a:off x="2817549" y="1655442"/>
-            <a:ext cx="1880999" cy="1712780"/>
-          </a:xfrm>
-          <a:prstGeom prst="roundRect">
-            <a:avLst/>
-          </a:prstGeom>
-          <a:solidFill>
-            <a:schemeClr val="bg1"/>
-          </a:solidFill>
-          <a:ln w="25400">
-            <a:solidFill>
-              <a:schemeClr val="tx1"/>
-            </a:solidFill>
-          </a:ln>
-          <a:effectLst>
-            <a:outerShdw blurRad="50800" dist="38100" dir="2700000" algn="tl" rotWithShape="0">
-              <a:prstClr val="black">
-                <a:alpha val="40000"/>
-              </a:prstClr>
-            </a:outerShdw>
-          </a:effectLst>
-        </p:spPr>
-        <p:style>
-          <a:lnRef idx="2">
-            <a:schemeClr val="accent1">
-              <a:shade val="50000"/>
-            </a:schemeClr>
-          </a:lnRef>
-          <a:fillRef idx="1">
-            <a:schemeClr val="accent1"/>
-          </a:fillRef>
-          <a:effectRef idx="0">
-            <a:schemeClr val="accent1"/>
-          </a:effectRef>
-          <a:fontRef idx="minor">
-            <a:schemeClr val="lt1"/>
-          </a:fontRef>
-        </p:style>
-        <p:txBody>
-          <a:bodyPr rtlCol="0" anchor="ctr"/>
-          <a:lstStyle/>
-          <a:p>
-            <a:pPr algn="ctr"/>
-            <a:endParaRPr lang="en-US"/>
-          </a:p>
-        </p:txBody>
-      </p:sp>
-      <p:sp>
-        <p:nvSpPr>
-          <p:cNvPr id="35" name="TextBox 34">
-            <a:extLst>
-              <a:ext uri="{FF2B5EF4-FFF2-40B4-BE49-F238E27FC236}">
-                <a16:creationId xmlns:a16="http://schemas.microsoft.com/office/drawing/2014/main" id="{6ECA65A4-259A-CA47-A57A-68C7C78330C5}"/>
-              </a:ext>
-            </a:extLst>
-          </p:cNvPr>
-          <p:cNvSpPr txBox="1"/>
-          <p:nvPr/>
-        </p:nvSpPr>
-        <p:spPr>
-          <a:xfrm>
-            <a:off x="3216996" y="1722106"/>
-            <a:ext cx="335348" cy="523220"/>
-          </a:xfrm>
-          <a:prstGeom prst="rect">
-            <a:avLst/>
-          </a:prstGeom>
-          <a:noFill/>
-        </p:spPr>
-        <p:txBody>
-          <a:bodyPr wrap="none" rtlCol="0">
-            <a:spAutoFit/>
-          </a:bodyPr>
-          <a:lstStyle/>
-          <a:p>
-            <a:r>
-              <a:rPr lang="en-US" sz="2800" dirty="0">
-                <a:solidFill>
-                  <a:schemeClr val="accent1">
-                    <a:lumMod val="50000"/>
-                  </a:schemeClr>
-                </a:solidFill>
-              </a:rPr>
-              <a:t>L</a:t>
-            </a:r>
-          </a:p>
-        </p:txBody>
-      </p:sp>
-      <p:sp>
-        <p:nvSpPr>
-          <p:cNvPr id="36" name="TextBox 35">
-            <a:extLst>
-              <a:ext uri="{FF2B5EF4-FFF2-40B4-BE49-F238E27FC236}">
-                <a16:creationId xmlns:a16="http://schemas.microsoft.com/office/drawing/2014/main" id="{5C09F7CA-F7B9-7B4E-BB3B-D0E564BA70EB}"/>
-              </a:ext>
-            </a:extLst>
-          </p:cNvPr>
-          <p:cNvSpPr txBox="1"/>
-          <p:nvPr/>
-        </p:nvSpPr>
-        <p:spPr>
-          <a:xfrm>
-            <a:off x="4195322" y="2245326"/>
-            <a:ext cx="335348" cy="523220"/>
-          </a:xfrm>
-          <a:prstGeom prst="rect">
-            <a:avLst/>
-          </a:prstGeom>
-          <a:noFill/>
-        </p:spPr>
-        <p:txBody>
-          <a:bodyPr wrap="none" rtlCol="0">
-            <a:spAutoFit/>
-          </a:bodyPr>
-          <a:lstStyle/>
-          <a:p>
-            <a:r>
-              <a:rPr lang="en-US" sz="2800" dirty="0">
-                <a:solidFill>
-                  <a:schemeClr val="accent1">
-                    <a:lumMod val="50000"/>
-                  </a:schemeClr>
-                </a:solidFill>
-              </a:rPr>
-              <a:t>L</a:t>
-            </a:r>
-          </a:p>
-        </p:txBody>
-      </p:sp>
-      <p:sp>
-        <p:nvSpPr>
-          <p:cNvPr id="37" name="TextBox 36">
-            <a:extLst>
-              <a:ext uri="{FF2B5EF4-FFF2-40B4-BE49-F238E27FC236}">
-                <a16:creationId xmlns:a16="http://schemas.microsoft.com/office/drawing/2014/main" id="{A19032F4-E6C0-9944-9E5B-B49BF7517E4F}"/>
-              </a:ext>
-            </a:extLst>
-          </p:cNvPr>
-          <p:cNvSpPr txBox="1"/>
-          <p:nvPr/>
-        </p:nvSpPr>
-        <p:spPr>
-          <a:xfrm>
-            <a:off x="2881648" y="2756859"/>
-            <a:ext cx="335348" cy="523220"/>
-          </a:xfrm>
-          <a:prstGeom prst="rect">
-            <a:avLst/>
-          </a:prstGeom>
-          <a:noFill/>
-        </p:spPr>
-        <p:txBody>
-          <a:bodyPr wrap="none" rtlCol="0">
-            <a:spAutoFit/>
-          </a:bodyPr>
-          <a:lstStyle/>
-          <a:p>
-            <a:r>
-              <a:rPr lang="en-US" sz="2800" dirty="0">
-                <a:solidFill>
-                  <a:schemeClr val="accent1">
-                    <a:lumMod val="50000"/>
-                  </a:schemeClr>
-                </a:solidFill>
-              </a:rPr>
-              <a:t>L</a:t>
-            </a:r>
-          </a:p>
-        </p:txBody>
-      </p:sp>
-      <p:sp>
-        <p:nvSpPr>
-          <p:cNvPr id="38" name="TextBox 37">
-            <a:extLst>
-              <a:ext uri="{FF2B5EF4-FFF2-40B4-BE49-F238E27FC236}">
-                <a16:creationId xmlns:a16="http://schemas.microsoft.com/office/drawing/2014/main" id="{4D69AA52-3B3A-1244-B4C4-B698FF7E155E}"/>
-              </a:ext>
-            </a:extLst>
-          </p:cNvPr>
-          <p:cNvSpPr txBox="1"/>
-          <p:nvPr/>
-        </p:nvSpPr>
-        <p:spPr>
-          <a:xfrm>
-            <a:off x="3706159" y="2494360"/>
-            <a:ext cx="335348" cy="523220"/>
-          </a:xfrm>
-          <a:prstGeom prst="rect">
-            <a:avLst/>
-          </a:prstGeom>
-          <a:noFill/>
-        </p:spPr>
-        <p:txBody>
-          <a:bodyPr wrap="none" rtlCol="0">
-            <a:spAutoFit/>
-          </a:bodyPr>
-          <a:lstStyle/>
-          <a:p>
-            <a:r>
-              <a:rPr lang="en-US" sz="2800" dirty="0">
-                <a:solidFill>
-                  <a:schemeClr val="accent1">
-                    <a:lumMod val="50000"/>
-                  </a:schemeClr>
-                </a:solidFill>
-              </a:rPr>
-              <a:t>L</a:t>
-            </a:r>
-          </a:p>
-        </p:txBody>
-      </p:sp>
-      <p:sp>
-        <p:nvSpPr>
-          <p:cNvPr id="39" name="TextBox 38">
-            <a:extLst>
-              <a:ext uri="{FF2B5EF4-FFF2-40B4-BE49-F238E27FC236}">
-                <a16:creationId xmlns:a16="http://schemas.microsoft.com/office/drawing/2014/main" id="{FF27C823-2F35-BE4A-996B-179E469BC8FE}"/>
-              </a:ext>
-            </a:extLst>
-          </p:cNvPr>
-          <p:cNvSpPr txBox="1"/>
-          <p:nvPr/>
-        </p:nvSpPr>
-        <p:spPr>
-          <a:xfrm>
-            <a:off x="2957773" y="3853134"/>
-            <a:ext cx="1433919" cy="369332"/>
-          </a:xfrm>
-          <a:prstGeom prst="rect">
-            <a:avLst/>
-          </a:prstGeom>
-          <a:noFill/>
-        </p:spPr>
-        <p:txBody>
-          <a:bodyPr wrap="none" rtlCol="0">
-            <a:spAutoFit/>
-          </a:bodyPr>
-          <a:lstStyle/>
-          <a:p>
-            <a:r>
-              <a:rPr lang="en-US" dirty="0"/>
-              <a:t>Initial Display</a:t>
-            </a:r>
-          </a:p>
-        </p:txBody>
-      </p:sp>
-    </p:spTree>
-    <p:extLst>
-      <p:ext uri="{BB962C8B-B14F-4D97-AF65-F5344CB8AC3E}">
-        <p14:creationId xmlns:p14="http://schemas.microsoft.com/office/powerpoint/2010/main" val="1730404450"/>
-      </p:ext>
-    </p:extLst>
-  </p:cSld>
-  <p:clrMapOvr>
-    <a:masterClrMapping/>
-  </p:clrMapOvr>
-</p:sld>
-</file>
-
 <file path=ppt/theme/theme1.xml><?xml version="1.0" encoding="utf-8"?>
 <a:theme xmlns:a="http://schemas.openxmlformats.org/drawingml/2006/main" name="Office Theme">
   <a:themeElements>

</xml_diff>